<commit_message>
Please review my edits
</commit_message>
<xml_diff>
--- a/Documents/Summer Project Presentation.pptx
+++ b/Documents/Summer Project Presentation.pptx
@@ -6,20 +6,22 @@
   </p:sldMasterIdLst>
   <p:sldIdLst>
     <p:sldId id="256" r:id="rId2"/>
-    <p:sldId id="257" r:id="rId3"/>
-    <p:sldId id="258" r:id="rId4"/>
-    <p:sldId id="259" r:id="rId5"/>
-    <p:sldId id="260" r:id="rId6"/>
-    <p:sldId id="270" r:id="rId7"/>
-    <p:sldId id="269" r:id="rId8"/>
-    <p:sldId id="261" r:id="rId9"/>
-    <p:sldId id="262" r:id="rId10"/>
-    <p:sldId id="263" r:id="rId11"/>
-    <p:sldId id="264" r:id="rId12"/>
-    <p:sldId id="265" r:id="rId13"/>
-    <p:sldId id="266" r:id="rId14"/>
-    <p:sldId id="267" r:id="rId15"/>
-    <p:sldId id="268" r:id="rId16"/>
+    <p:sldId id="271" r:id="rId3"/>
+    <p:sldId id="257" r:id="rId4"/>
+    <p:sldId id="258" r:id="rId5"/>
+    <p:sldId id="259" r:id="rId6"/>
+    <p:sldId id="260" r:id="rId7"/>
+    <p:sldId id="270" r:id="rId8"/>
+    <p:sldId id="269" r:id="rId9"/>
+    <p:sldId id="272" r:id="rId10"/>
+    <p:sldId id="261" r:id="rId11"/>
+    <p:sldId id="262" r:id="rId12"/>
+    <p:sldId id="263" r:id="rId13"/>
+    <p:sldId id="264" r:id="rId14"/>
+    <p:sldId id="265" r:id="rId15"/>
+    <p:sldId id="266" r:id="rId16"/>
+    <p:sldId id="267" r:id="rId17"/>
+    <p:sldId id="268" r:id="rId18"/>
   </p:sldIdLst>
   <p:sldSz cx="12192000" cy="6858000"/>
   <p:notesSz cx="6858000" cy="9144000"/>
@@ -347,7 +349,8 @@
           <a:p>
             <a:fld id="{B0B99EA6-6E70-4D4D-9C4B-0A10C6E220BB}" type="datetimeFigureOut">
               <a:rPr lang="en-US" smtClean="0"/>
-              <a:t>7/17/2018</a:t>
+              <a:pPr/>
+              <a:t>7/20/2018</a:t>
             </a:fld>
             <a:endParaRPr lang="en-US"/>
           </a:p>
@@ -389,6 +392,7 @@
           <a:p>
             <a:fld id="{C73EA1A7-BA1C-4B74-B54B-6903BD651DDB}" type="slidenum">
               <a:rPr lang="en-US" smtClean="0"/>
+              <a:pPr/>
               <a:t>‹#›</a:t>
             </a:fld>
             <a:endParaRPr lang="en-US"/>
@@ -436,7 +440,7 @@
     </p:spTree>
     <p:extLst>
       <p:ext uri="{BB962C8B-B14F-4D97-AF65-F5344CB8AC3E}">
-        <p14:creationId xmlns:p14="http://schemas.microsoft.com/office/powerpoint/2010/main" val="3172840111"/>
+        <p14:creationId xmlns:p14="http://schemas.microsoft.com/office/powerpoint/2010/main" xmlns="" val="3172840111"/>
       </p:ext>
     </p:extLst>
   </p:cSld>
@@ -555,7 +559,8 @@
           <a:p>
             <a:fld id="{B0B99EA6-6E70-4D4D-9C4B-0A10C6E220BB}" type="datetimeFigureOut">
               <a:rPr lang="en-US" smtClean="0"/>
-              <a:t>7/17/2018</a:t>
+              <a:pPr/>
+              <a:t>7/20/2018</a:t>
             </a:fld>
             <a:endParaRPr lang="en-US"/>
           </a:p>
@@ -597,6 +602,7 @@
           <a:p>
             <a:fld id="{C73EA1A7-BA1C-4B74-B54B-6903BD651DDB}" type="slidenum">
               <a:rPr lang="en-US" smtClean="0"/>
+              <a:pPr/>
               <a:t>‹#›</a:t>
             </a:fld>
             <a:endParaRPr lang="en-US"/>
@@ -606,7 +612,7 @@
     </p:spTree>
     <p:extLst>
       <p:ext uri="{BB962C8B-B14F-4D97-AF65-F5344CB8AC3E}">
-        <p14:creationId xmlns:p14="http://schemas.microsoft.com/office/powerpoint/2010/main" val="2094403061"/>
+        <p14:creationId xmlns:p14="http://schemas.microsoft.com/office/powerpoint/2010/main" xmlns="" val="2094403061"/>
       </p:ext>
     </p:extLst>
   </p:cSld>
@@ -811,7 +817,8 @@
           <a:p>
             <a:fld id="{B0B99EA6-6E70-4D4D-9C4B-0A10C6E220BB}" type="datetimeFigureOut">
               <a:rPr lang="en-US" smtClean="0"/>
-              <a:t>7/17/2018</a:t>
+              <a:pPr/>
+              <a:t>7/20/2018</a:t>
             </a:fld>
             <a:endParaRPr lang="en-US"/>
           </a:p>
@@ -853,6 +860,7 @@
           <a:p>
             <a:fld id="{C73EA1A7-BA1C-4B74-B54B-6903BD651DDB}" type="slidenum">
               <a:rPr lang="en-US" smtClean="0"/>
+              <a:pPr/>
               <a:t>‹#›</a:t>
             </a:fld>
             <a:endParaRPr lang="en-US"/>
@@ -862,7 +870,7 @@
     </p:spTree>
     <p:extLst>
       <p:ext uri="{BB962C8B-B14F-4D97-AF65-F5344CB8AC3E}">
-        <p14:creationId xmlns:p14="http://schemas.microsoft.com/office/powerpoint/2010/main" val="934116125"/>
+        <p14:creationId xmlns:p14="http://schemas.microsoft.com/office/powerpoint/2010/main" xmlns="" val="934116125"/>
       </p:ext>
     </p:extLst>
   </p:cSld>
@@ -985,7 +993,8 @@
           <a:p>
             <a:fld id="{B0B99EA6-6E70-4D4D-9C4B-0A10C6E220BB}" type="datetimeFigureOut">
               <a:rPr lang="en-US" smtClean="0"/>
-              <a:t>7/17/2018</a:t>
+              <a:pPr/>
+              <a:t>7/20/2018</a:t>
             </a:fld>
             <a:endParaRPr lang="en-US"/>
           </a:p>
@@ -1027,6 +1036,7 @@
           <a:p>
             <a:fld id="{C73EA1A7-BA1C-4B74-B54B-6903BD651DDB}" type="slidenum">
               <a:rPr lang="en-US" smtClean="0"/>
+              <a:pPr/>
               <a:t>‹#›</a:t>
             </a:fld>
             <a:endParaRPr lang="en-US"/>
@@ -1036,7 +1046,7 @@
     </p:spTree>
     <p:extLst>
       <p:ext uri="{BB962C8B-B14F-4D97-AF65-F5344CB8AC3E}">
-        <p14:creationId xmlns:p14="http://schemas.microsoft.com/office/powerpoint/2010/main" val="3097829799"/>
+        <p14:creationId xmlns:p14="http://schemas.microsoft.com/office/powerpoint/2010/main" xmlns="" val="3097829799"/>
       </p:ext>
     </p:extLst>
   </p:cSld>
@@ -1328,7 +1338,8 @@
           <a:p>
             <a:fld id="{B0B99EA6-6E70-4D4D-9C4B-0A10C6E220BB}" type="datetimeFigureOut">
               <a:rPr lang="en-US" smtClean="0"/>
-              <a:t>7/17/2018</a:t>
+              <a:pPr/>
+              <a:t>7/20/2018</a:t>
             </a:fld>
             <a:endParaRPr lang="en-US"/>
           </a:p>
@@ -1370,6 +1381,7 @@
           <a:p>
             <a:fld id="{C73EA1A7-BA1C-4B74-B54B-6903BD651DDB}" type="slidenum">
               <a:rPr lang="en-US" smtClean="0"/>
+              <a:pPr/>
               <a:t>‹#›</a:t>
             </a:fld>
             <a:endParaRPr lang="en-US"/>
@@ -1417,7 +1429,7 @@
     </p:spTree>
     <p:extLst>
       <p:ext uri="{BB962C8B-B14F-4D97-AF65-F5344CB8AC3E}">
-        <p14:creationId xmlns:p14="http://schemas.microsoft.com/office/powerpoint/2010/main" val="4148898045"/>
+        <p14:creationId xmlns:p14="http://schemas.microsoft.com/office/powerpoint/2010/main" xmlns="" val="4148898045"/>
       </p:ext>
     </p:extLst>
   </p:cSld>
@@ -1603,7 +1615,8 @@
           <a:p>
             <a:fld id="{B0B99EA6-6E70-4D4D-9C4B-0A10C6E220BB}" type="datetimeFigureOut">
               <a:rPr lang="en-US" smtClean="0"/>
-              <a:t>7/17/2018</a:t>
+              <a:pPr/>
+              <a:t>7/20/2018</a:t>
             </a:fld>
             <a:endParaRPr lang="en-US"/>
           </a:p>
@@ -1645,6 +1658,7 @@
           <a:p>
             <a:fld id="{C73EA1A7-BA1C-4B74-B54B-6903BD651DDB}" type="slidenum">
               <a:rPr lang="en-US" smtClean="0"/>
+              <a:pPr/>
               <a:t>‹#›</a:t>
             </a:fld>
             <a:endParaRPr lang="en-US"/>
@@ -1654,7 +1668,7 @@
     </p:spTree>
     <p:extLst>
       <p:ext uri="{BB962C8B-B14F-4D97-AF65-F5344CB8AC3E}">
-        <p14:creationId xmlns:p14="http://schemas.microsoft.com/office/powerpoint/2010/main" val="2838466399"/>
+        <p14:creationId xmlns:p14="http://schemas.microsoft.com/office/powerpoint/2010/main" xmlns="" val="2838466399"/>
       </p:ext>
     </p:extLst>
   </p:cSld>
@@ -1982,7 +1996,8 @@
           <a:p>
             <a:fld id="{B0B99EA6-6E70-4D4D-9C4B-0A10C6E220BB}" type="datetimeFigureOut">
               <a:rPr lang="en-US" smtClean="0"/>
-              <a:t>7/17/2018</a:t>
+              <a:pPr/>
+              <a:t>7/20/2018</a:t>
             </a:fld>
             <a:endParaRPr lang="en-US"/>
           </a:p>
@@ -2024,6 +2039,7 @@
           <a:p>
             <a:fld id="{C73EA1A7-BA1C-4B74-B54B-6903BD651DDB}" type="slidenum">
               <a:rPr lang="en-US" smtClean="0"/>
+              <a:pPr/>
               <a:t>‹#›</a:t>
             </a:fld>
             <a:endParaRPr lang="en-US"/>
@@ -2033,7 +2049,7 @@
     </p:spTree>
     <p:extLst>
       <p:ext uri="{BB962C8B-B14F-4D97-AF65-F5344CB8AC3E}">
-        <p14:creationId xmlns:p14="http://schemas.microsoft.com/office/powerpoint/2010/main" val="3102526420"/>
+        <p14:creationId xmlns:p14="http://schemas.microsoft.com/office/powerpoint/2010/main" xmlns="" val="3102526420"/>
       </p:ext>
     </p:extLst>
   </p:cSld>
@@ -2100,7 +2116,8 @@
           <a:p>
             <a:fld id="{B0B99EA6-6E70-4D4D-9C4B-0A10C6E220BB}" type="datetimeFigureOut">
               <a:rPr lang="en-US" smtClean="0"/>
-              <a:t>7/17/2018</a:t>
+              <a:pPr/>
+              <a:t>7/20/2018</a:t>
             </a:fld>
             <a:endParaRPr lang="en-US"/>
           </a:p>
@@ -2142,6 +2159,7 @@
           <a:p>
             <a:fld id="{C73EA1A7-BA1C-4B74-B54B-6903BD651DDB}" type="slidenum">
               <a:rPr lang="en-US" smtClean="0"/>
+              <a:pPr/>
               <a:t>‹#›</a:t>
             </a:fld>
             <a:endParaRPr lang="en-US"/>
@@ -2151,7 +2169,7 @@
     </p:spTree>
     <p:extLst>
       <p:ext uri="{BB962C8B-B14F-4D97-AF65-F5344CB8AC3E}">
-        <p14:creationId xmlns:p14="http://schemas.microsoft.com/office/powerpoint/2010/main" val="1501534272"/>
+        <p14:creationId xmlns:p14="http://schemas.microsoft.com/office/powerpoint/2010/main" xmlns="" val="1501534272"/>
       </p:ext>
     </p:extLst>
   </p:cSld>
@@ -2271,7 +2289,8 @@
           <a:p>
             <a:fld id="{B0B99EA6-6E70-4D4D-9C4B-0A10C6E220BB}" type="datetimeFigureOut">
               <a:rPr lang="en-US" smtClean="0"/>
-              <a:t>7/17/2018</a:t>
+              <a:pPr/>
+              <a:t>7/20/2018</a:t>
             </a:fld>
             <a:endParaRPr lang="en-US"/>
           </a:p>
@@ -2321,6 +2340,7 @@
           <a:p>
             <a:fld id="{C73EA1A7-BA1C-4B74-B54B-6903BD651DDB}" type="slidenum">
               <a:rPr lang="en-US" smtClean="0"/>
+              <a:pPr/>
               <a:t>‹#›</a:t>
             </a:fld>
             <a:endParaRPr lang="en-US"/>
@@ -2330,7 +2350,7 @@
     </p:spTree>
     <p:extLst>
       <p:ext uri="{BB962C8B-B14F-4D97-AF65-F5344CB8AC3E}">
-        <p14:creationId xmlns:p14="http://schemas.microsoft.com/office/powerpoint/2010/main" val="4051415731"/>
+        <p14:creationId xmlns:p14="http://schemas.microsoft.com/office/powerpoint/2010/main" xmlns="" val="4051415731"/>
       </p:ext>
     </p:extLst>
   </p:cSld>
@@ -2625,7 +2645,8 @@
           <a:p>
             <a:fld id="{B0B99EA6-6E70-4D4D-9C4B-0A10C6E220BB}" type="datetimeFigureOut">
               <a:rPr lang="en-US" smtClean="0"/>
-              <a:t>7/17/2018</a:t>
+              <a:pPr/>
+              <a:t>7/20/2018</a:t>
             </a:fld>
             <a:endParaRPr lang="en-US"/>
           </a:p>
@@ -2688,6 +2709,7 @@
           <a:p>
             <a:fld id="{C73EA1A7-BA1C-4B74-B54B-6903BD651DDB}" type="slidenum">
               <a:rPr lang="en-US" smtClean="0"/>
+              <a:pPr/>
               <a:t>‹#›</a:t>
             </a:fld>
             <a:endParaRPr lang="en-US"/>
@@ -2697,7 +2719,7 @@
     </p:spTree>
     <p:extLst>
       <p:ext uri="{BB962C8B-B14F-4D97-AF65-F5344CB8AC3E}">
-        <p14:creationId xmlns:p14="http://schemas.microsoft.com/office/powerpoint/2010/main" val="4101870949"/>
+        <p14:creationId xmlns:p14="http://schemas.microsoft.com/office/powerpoint/2010/main" xmlns="" val="4101870949"/>
       </p:ext>
     </p:extLst>
   </p:cSld>
@@ -2854,7 +2876,7 @@
             <a:ext cx="12191985" cy="4915076"/>
           </a:xfrm>
           <a:blipFill>
-            <a:blip r:embed="rId2"/>
+            <a:blip r:embed="rId2" cstate="print"/>
             <a:stretch>
               <a:fillRect/>
             </a:stretch>
@@ -3007,7 +3029,8 @@
           <a:p>
             <a:fld id="{B0B99EA6-6E70-4D4D-9C4B-0A10C6E220BB}" type="datetimeFigureOut">
               <a:rPr lang="en-US" smtClean="0"/>
-              <a:t>7/17/2018</a:t>
+              <a:pPr/>
+              <a:t>7/20/2018</a:t>
             </a:fld>
             <a:endParaRPr lang="en-US"/>
           </a:p>
@@ -3049,6 +3072,7 @@
           <a:p>
             <a:fld id="{C73EA1A7-BA1C-4B74-B54B-6903BD651DDB}" type="slidenum">
               <a:rPr lang="en-US" smtClean="0"/>
+              <a:pPr/>
               <a:t>‹#›</a:t>
             </a:fld>
             <a:endParaRPr lang="en-US"/>
@@ -3058,7 +3082,7 @@
     </p:spTree>
     <p:extLst>
       <p:ext uri="{BB962C8B-B14F-4D97-AF65-F5344CB8AC3E}">
-        <p14:creationId xmlns:p14="http://schemas.microsoft.com/office/powerpoint/2010/main" val="2169258192"/>
+        <p14:creationId xmlns:p14="http://schemas.microsoft.com/office/powerpoint/2010/main" xmlns="" val="2169258192"/>
       </p:ext>
     </p:extLst>
   </p:cSld>
@@ -3294,7 +3318,8 @@
           <a:p>
             <a:fld id="{B0B99EA6-6E70-4D4D-9C4B-0A10C6E220BB}" type="datetimeFigureOut">
               <a:rPr lang="en-US" smtClean="0"/>
-              <a:t>7/17/2018</a:t>
+              <a:pPr/>
+              <a:t>7/20/2018</a:t>
             </a:fld>
             <a:endParaRPr lang="en-US"/>
           </a:p>
@@ -3368,6 +3393,7 @@
           <a:p>
             <a:fld id="{C73EA1A7-BA1C-4B74-B54B-6903BD651DDB}" type="slidenum">
               <a:rPr lang="en-US" smtClean="0"/>
+              <a:pPr/>
               <a:t>‹#›</a:t>
             </a:fld>
             <a:endParaRPr lang="en-US"/>
@@ -3415,7 +3441,7 @@
     </p:spTree>
     <p:extLst>
       <p:ext uri="{BB962C8B-B14F-4D97-AF65-F5344CB8AC3E}">
-        <p14:creationId xmlns:p14="http://schemas.microsoft.com/office/powerpoint/2010/main" val="3519944650"/>
+        <p14:creationId xmlns:p14="http://schemas.microsoft.com/office/powerpoint/2010/main" xmlns="" val="3519944650"/>
       </p:ext>
     </p:extLst>
   </p:cSld>
@@ -3823,7 +3849,7 @@
           <p:cNvPr id="4" name="Title 3">
             <a:extLst>
               <a:ext uri="{FF2B5EF4-FFF2-40B4-BE49-F238E27FC236}">
-                <a16:creationId xmlns:a16="http://schemas.microsoft.com/office/drawing/2014/main" id="{0997A5F6-E6E2-4AEF-B843-1845ABBCDDEA}"/>
+                <a16:creationId xmlns:a16="http://schemas.microsoft.com/office/drawing/2014/main" xmlns="" id="{0997A5F6-E6E2-4AEF-B843-1845ABBCDDEA}"/>
               </a:ext>
             </a:extLst>
           </p:cNvPr>
@@ -3853,7 +3879,7 @@
           <p:cNvPr id="5" name="Subtitle 4">
             <a:extLst>
               <a:ext uri="{FF2B5EF4-FFF2-40B4-BE49-F238E27FC236}">
-                <a16:creationId xmlns:a16="http://schemas.microsoft.com/office/drawing/2014/main" id="{F24B386A-51D0-492F-8518-FABD7686FCE4}"/>
+                <a16:creationId xmlns:a16="http://schemas.microsoft.com/office/drawing/2014/main" xmlns="" id="{F24B386A-51D0-492F-8518-FABD7686FCE4}"/>
               </a:ext>
             </a:extLst>
           </p:cNvPr>
@@ -3893,7 +3919,7 @@
     </p:spTree>
     <p:extLst>
       <p:ext uri="{BB962C8B-B14F-4D97-AF65-F5344CB8AC3E}">
-        <p14:creationId xmlns:p14="http://schemas.microsoft.com/office/powerpoint/2010/main" val="1617513739"/>
+        <p14:creationId xmlns:p14="http://schemas.microsoft.com/office/powerpoint/2010/main" xmlns="" val="1617513739"/>
       </p:ext>
     </p:extLst>
   </p:cSld>
@@ -3925,7 +3951,7 @@
           <p:cNvPr id="2" name="Title 1">
             <a:extLst>
               <a:ext uri="{FF2B5EF4-FFF2-40B4-BE49-F238E27FC236}">
-                <a16:creationId xmlns:a16="http://schemas.microsoft.com/office/drawing/2014/main" id="{121E3644-C225-42AB-A35C-0334B3ABF13A}"/>
+                <a16:creationId xmlns:a16="http://schemas.microsoft.com/office/drawing/2014/main" xmlns="" id="{70D48B48-8FF1-413E-880E-7681A875DA81}"/>
               </a:ext>
             </a:extLst>
           </p:cNvPr>
@@ -3953,7 +3979,7 @@
           <p:cNvPr id="3" name="Content Placeholder 2">
             <a:extLst>
               <a:ext uri="{FF2B5EF4-FFF2-40B4-BE49-F238E27FC236}">
-                <a16:creationId xmlns:a16="http://schemas.microsoft.com/office/drawing/2014/main" id="{4ECE8CB0-111B-4F4C-8D03-DB86A011D446}"/>
+                <a16:creationId xmlns:a16="http://schemas.microsoft.com/office/drawing/2014/main" xmlns="" id="{40EF1FC0-EB1C-45A1-A377-1A31EDB1307C}"/>
               </a:ext>
             </a:extLst>
           </p:cNvPr>
@@ -3961,53 +3987,109 @@
             <a:spLocks noGrp="1"/>
           </p:cNvSpPr>
           <p:nvPr>
-            <p:ph sz="half" idx="1"/>
-          </p:nvPr>
-        </p:nvSpPr>
-        <p:spPr/>
-        <p:txBody>
-          <a:bodyPr/>
-          <a:lstStyle/>
-          <a:p>
+            <p:ph idx="1"/>
+          </p:nvPr>
+        </p:nvSpPr>
+        <p:spPr/>
+        <p:txBody>
+          <a:bodyPr/>
+          <a:lstStyle/>
+          <a:p>
+            <a:pPr>
+              <a:buFont typeface="Courier New" panose="02070309020205020404" pitchFamily="49" charset="0"/>
+              <a:buChar char="o"/>
+            </a:pPr>
             <a:r>
               <a:rPr lang="en-US" dirty="0"/>
-              <a:t>More results</a:t>
-            </a:r>
-          </a:p>
-        </p:txBody>
-      </p:sp>
-      <p:sp>
-        <p:nvSpPr>
-          <p:cNvPr id="4" name="Content Placeholder 3">
-            <a:extLst>
-              <a:ext uri="{FF2B5EF4-FFF2-40B4-BE49-F238E27FC236}">
-                <a16:creationId xmlns:a16="http://schemas.microsoft.com/office/drawing/2014/main" id="{A975B9CE-DB31-42C5-BE86-A8C0C206EB35}"/>
-              </a:ext>
-            </a:extLst>
-          </p:cNvPr>
-          <p:cNvSpPr>
-            <a:spLocks noGrp="1"/>
-          </p:cNvSpPr>
-          <p:nvPr>
-            <p:ph sz="half" idx="2"/>
-          </p:nvPr>
-        </p:nvSpPr>
-        <p:spPr/>
-        <p:txBody>
-          <a:bodyPr/>
-          <a:lstStyle/>
-          <a:p>
+              <a:t>Shorter diapausing strain had a higher rate of digestive efficiency compared to the strain with longer diapause</a:t>
+            </a:r>
+          </a:p>
+          <a:p>
+            <a:pPr lvl="1">
+              <a:buFont typeface="Courier New" panose="02070309020205020404" pitchFamily="49" charset="0"/>
+              <a:buChar char="o"/>
+            </a:pPr>
             <a:r>
               <a:rPr lang="en-US" dirty="0"/>
-              <a:t>Photos of results/graphs</a:t>
-            </a:r>
+              <a:t>Higher digestive efficiency could be beneficial because of higher resource </a:t>
+            </a:r>
+            <a:r>
+              <a:rPr lang="en-US" dirty="0" smtClean="0"/>
+              <a:t>competition</a:t>
+            </a:r>
+          </a:p>
+          <a:p>
+            <a:pPr lvl="1">
+              <a:buFont typeface="Courier New" panose="02070309020205020404" pitchFamily="49" charset="0"/>
+              <a:buChar char="o"/>
+            </a:pPr>
+            <a:endParaRPr lang="en-US" dirty="0" smtClean="0"/>
+          </a:p>
+          <a:p>
+            <a:pPr>
+              <a:buFont typeface="Courier New" panose="02070309020205020404" pitchFamily="49" charset="0"/>
+              <a:buChar char="o"/>
+            </a:pPr>
+            <a:r>
+              <a:rPr lang="en-US" dirty="0" smtClean="0"/>
+              <a:t>Edits:</a:t>
+            </a:r>
+          </a:p>
+          <a:p>
+            <a:pPr lvl="1">
+              <a:buFont typeface="Courier New" panose="02070309020205020404" pitchFamily="49" charset="0"/>
+              <a:buChar char="o"/>
+            </a:pPr>
+            <a:r>
+              <a:rPr lang="en-US" dirty="0" smtClean="0"/>
+              <a:t>Compress this information onto the slides with the graphs</a:t>
+            </a:r>
+          </a:p>
+          <a:p>
+            <a:pPr lvl="1">
+              <a:buFont typeface="Courier New" panose="02070309020205020404" pitchFamily="49" charset="0"/>
+              <a:buChar char="o"/>
+            </a:pPr>
+            <a:r>
+              <a:rPr lang="en-US" dirty="0" smtClean="0"/>
+              <a:t>The information should be specific. What exactly did we see in the data? Independent variable, dependent variable, then the comparison</a:t>
+            </a:r>
+          </a:p>
+          <a:p>
+            <a:pPr lvl="1">
+              <a:buFont typeface="Courier New" panose="02070309020205020404" pitchFamily="49" charset="0"/>
+              <a:buChar char="o"/>
+            </a:pPr>
+            <a:r>
+              <a:rPr lang="en-US" dirty="0" smtClean="0"/>
+              <a:t>This bullet is out of place and needs to be moved to the discussion section</a:t>
+            </a:r>
+          </a:p>
+          <a:p>
+            <a:pPr lvl="2">
+              <a:buFont typeface="Courier New" panose="02070309020205020404" pitchFamily="49" charset="0"/>
+              <a:buChar char="o"/>
+            </a:pPr>
+            <a:r>
+              <a:rPr lang="en-US" dirty="0" smtClean="0"/>
+              <a:t>“</a:t>
+            </a:r>
+            <a:r>
+              <a:rPr lang="en-US" dirty="0" smtClean="0"/>
+              <a:t>Higher digestive efficiency could be beneficial because of higher resource </a:t>
+            </a:r>
+            <a:r>
+              <a:rPr lang="en-US" dirty="0" smtClean="0"/>
+              <a:t>competition”</a:t>
+            </a:r>
+            <a:endParaRPr lang="en-US" dirty="0" smtClean="0"/>
           </a:p>
         </p:txBody>
       </p:sp>
     </p:spTree>
     <p:extLst>
       <p:ext uri="{BB962C8B-B14F-4D97-AF65-F5344CB8AC3E}">
-        <p14:creationId xmlns:p14="http://schemas.microsoft.com/office/powerpoint/2010/main" val="2640203804"/>
+        <p14:creationId xmlns:p14="http://schemas.microsoft.com/office/powerpoint/2010/main" xmlns="" val="1994198642"/>
       </p:ext>
     </p:extLst>
   </p:cSld>
@@ -4039,7 +4121,7 @@
           <p:cNvPr id="2" name="Title 1">
             <a:extLst>
               <a:ext uri="{FF2B5EF4-FFF2-40B4-BE49-F238E27FC236}">
-                <a16:creationId xmlns:a16="http://schemas.microsoft.com/office/drawing/2014/main" id="{AB7A110D-5D02-464D-912A-94576CF1FA0B}"/>
+                <a16:creationId xmlns:a16="http://schemas.microsoft.com/office/drawing/2014/main" xmlns="" id="{0883E4F5-61BD-4447-888A-091C5F45A555}"/>
               </a:ext>
             </a:extLst>
           </p:cNvPr>
@@ -4064,10 +4146,10 @@
       </p:sp>
       <p:sp>
         <p:nvSpPr>
-          <p:cNvPr id="4" name="Text Placeholder 3">
+          <p:cNvPr id="3" name="Text Placeholder 2">
             <a:extLst>
               <a:ext uri="{FF2B5EF4-FFF2-40B4-BE49-F238E27FC236}">
-                <a16:creationId xmlns:a16="http://schemas.microsoft.com/office/drawing/2014/main" id="{FEABBEBC-4034-44D7-AD06-F05034F5C7FF}"/>
+                <a16:creationId xmlns:a16="http://schemas.microsoft.com/office/drawing/2014/main" xmlns="" id="{85E7B115-B260-47D6-8DDB-4DD714533DF0}"/>
               </a:ext>
             </a:extLst>
           </p:cNvPr>
@@ -4075,7 +4157,7 @@
             <a:spLocks noGrp="1"/>
           </p:cNvSpPr>
           <p:nvPr>
-            <p:ph type="body" sz="half" idx="2"/>
+            <p:ph type="body" idx="1"/>
           </p:nvPr>
         </p:nvSpPr>
         <p:spPr/>
@@ -4085,15 +4167,93 @@
           <a:p>
             <a:r>
               <a:rPr lang="en-US" dirty="0"/>
-              <a:t>Photos of larvae</a:t>
-            </a:r>
+              <a:t>Graphs</a:t>
+            </a:r>
+          </a:p>
+        </p:txBody>
+      </p:sp>
+      <p:sp>
+        <p:nvSpPr>
+          <p:cNvPr id="4" name="Content Placeholder 3">
+            <a:extLst>
+              <a:ext uri="{FF2B5EF4-FFF2-40B4-BE49-F238E27FC236}">
+                <a16:creationId xmlns:a16="http://schemas.microsoft.com/office/drawing/2014/main" xmlns="" id="{DFD8B28C-E82A-4C37-B0C5-C09AC206D98F}"/>
+              </a:ext>
+            </a:extLst>
+          </p:cNvPr>
+          <p:cNvSpPr>
+            <a:spLocks noGrp="1"/>
+          </p:cNvSpPr>
+          <p:nvPr>
+            <p:ph sz="half" idx="2"/>
+          </p:nvPr>
+        </p:nvSpPr>
+        <p:spPr/>
+        <p:txBody>
+          <a:bodyPr/>
+          <a:lstStyle/>
+          <a:p>
+            <a:endParaRPr lang="en-US" dirty="0"/>
+          </a:p>
+        </p:txBody>
+      </p:sp>
+      <p:sp>
+        <p:nvSpPr>
+          <p:cNvPr id="5" name="Text Placeholder 4">
+            <a:extLst>
+              <a:ext uri="{FF2B5EF4-FFF2-40B4-BE49-F238E27FC236}">
+                <a16:creationId xmlns:a16="http://schemas.microsoft.com/office/drawing/2014/main" xmlns="" id="{FD0BB881-B19B-4709-8C57-1184BF9F7AC1}"/>
+              </a:ext>
+            </a:extLst>
+          </p:cNvPr>
+          <p:cNvSpPr>
+            <a:spLocks noGrp="1"/>
+          </p:cNvSpPr>
+          <p:nvPr>
+            <p:ph type="body" sz="quarter" idx="3"/>
+          </p:nvPr>
+        </p:nvSpPr>
+        <p:spPr/>
+        <p:txBody>
+          <a:bodyPr/>
+          <a:lstStyle/>
+          <a:p>
+            <a:r>
+              <a:rPr lang="en-US" dirty="0"/>
+              <a:t>graphs</a:t>
+            </a:r>
+          </a:p>
+        </p:txBody>
+      </p:sp>
+      <p:sp>
+        <p:nvSpPr>
+          <p:cNvPr id="6" name="Content Placeholder 5">
+            <a:extLst>
+              <a:ext uri="{FF2B5EF4-FFF2-40B4-BE49-F238E27FC236}">
+                <a16:creationId xmlns:a16="http://schemas.microsoft.com/office/drawing/2014/main" xmlns="" id="{26E5540A-0F8F-4E68-BF68-49B92A0DDFBD}"/>
+              </a:ext>
+            </a:extLst>
+          </p:cNvPr>
+          <p:cNvSpPr>
+            <a:spLocks noGrp="1"/>
+          </p:cNvSpPr>
+          <p:nvPr>
+            <p:ph sz="quarter" idx="4"/>
+          </p:nvPr>
+        </p:nvSpPr>
+        <p:spPr/>
+        <p:txBody>
+          <a:bodyPr/>
+          <a:lstStyle/>
+          <a:p>
+            <a:endParaRPr lang="en-US"/>
           </a:p>
         </p:txBody>
       </p:sp>
     </p:spTree>
     <p:extLst>
       <p:ext uri="{BB962C8B-B14F-4D97-AF65-F5344CB8AC3E}">
-        <p14:creationId xmlns:p14="http://schemas.microsoft.com/office/powerpoint/2010/main" val="2484200750"/>
+        <p14:creationId xmlns:p14="http://schemas.microsoft.com/office/powerpoint/2010/main" xmlns="" val="3622802638"/>
       </p:ext>
     </p:extLst>
   </p:cSld>
@@ -4125,7 +4285,7 @@
           <p:cNvPr id="2" name="Title 1">
             <a:extLst>
               <a:ext uri="{FF2B5EF4-FFF2-40B4-BE49-F238E27FC236}">
-                <a16:creationId xmlns:a16="http://schemas.microsoft.com/office/drawing/2014/main" id="{C566A25D-02C2-4A5E-B6B7-66AFCD7A7217}"/>
+                <a16:creationId xmlns:a16="http://schemas.microsoft.com/office/drawing/2014/main" xmlns="" id="{121E3644-C225-42AB-A35C-0334B3ABF13A}"/>
               </a:ext>
             </a:extLst>
           </p:cNvPr>
@@ -4143,7 +4303,7 @@
           <a:p>
             <a:r>
               <a:rPr lang="en-US" dirty="0"/>
-              <a:t>Discussion</a:t>
+              <a:t>Results</a:t>
             </a:r>
           </a:p>
         </p:txBody>
@@ -4153,7 +4313,7 @@
           <p:cNvPr id="3" name="Content Placeholder 2">
             <a:extLst>
               <a:ext uri="{FF2B5EF4-FFF2-40B4-BE49-F238E27FC236}">
-                <a16:creationId xmlns:a16="http://schemas.microsoft.com/office/drawing/2014/main" id="{FB1BCA34-A1AC-4452-85FD-9FBF108631F1}"/>
+                <a16:creationId xmlns:a16="http://schemas.microsoft.com/office/drawing/2014/main" xmlns="" id="{4ECE8CB0-111B-4F4C-8D03-DB86A011D446}"/>
               </a:ext>
             </a:extLst>
           </p:cNvPr>
@@ -4161,41 +4321,45 @@
             <a:spLocks noGrp="1"/>
           </p:cNvSpPr>
           <p:nvPr>
-            <p:ph idx="1"/>
-          </p:nvPr>
-        </p:nvSpPr>
-        <p:spPr/>
-        <p:txBody>
-          <a:bodyPr/>
-          <a:lstStyle/>
-          <a:p>
-            <a:pPr>
-              <a:buFont typeface="Courier New" panose="02070309020205020404" pitchFamily="49" charset="0"/>
-              <a:buChar char="o"/>
-            </a:pPr>
+            <p:ph sz="half" idx="1"/>
+          </p:nvPr>
+        </p:nvSpPr>
+        <p:spPr/>
+        <p:txBody>
+          <a:bodyPr/>
+          <a:lstStyle/>
+          <a:p>
             <a:r>
               <a:rPr lang="en-US" dirty="0"/>
-              <a:t>Applications of results</a:t>
-            </a:r>
-          </a:p>
-          <a:p>
-            <a:pPr lvl="1">
-              <a:buFont typeface="Courier New" panose="02070309020205020404" pitchFamily="49" charset="0"/>
-              <a:buChar char="o"/>
-            </a:pPr>
+              <a:t>More results</a:t>
+            </a:r>
+          </a:p>
+        </p:txBody>
+      </p:sp>
+      <p:sp>
+        <p:nvSpPr>
+          <p:cNvPr id="4" name="Content Placeholder 3">
+            <a:extLst>
+              <a:ext uri="{FF2B5EF4-FFF2-40B4-BE49-F238E27FC236}">
+                <a16:creationId xmlns:a16="http://schemas.microsoft.com/office/drawing/2014/main" xmlns="" id="{A975B9CE-DB31-42C5-BE86-A8C0C206EB35}"/>
+              </a:ext>
+            </a:extLst>
+          </p:cNvPr>
+          <p:cNvSpPr>
+            <a:spLocks noGrp="1"/>
+          </p:cNvSpPr>
+          <p:nvPr>
+            <p:ph sz="half" idx="2"/>
+          </p:nvPr>
+        </p:nvSpPr>
+        <p:spPr/>
+        <p:txBody>
+          <a:bodyPr/>
+          <a:lstStyle/>
+          <a:p>
             <a:r>
               <a:rPr lang="en-US" dirty="0"/>
-              <a:t>More efficient pest management systems</a:t>
-            </a:r>
-          </a:p>
-          <a:p>
-            <a:pPr lvl="1">
-              <a:buFont typeface="Courier New" panose="02070309020205020404" pitchFamily="49" charset="0"/>
-              <a:buChar char="o"/>
-            </a:pPr>
-            <a:r>
-              <a:rPr lang="en-US" dirty="0"/>
-              <a:t>Compensation for crop loss</a:t>
+              <a:t>Photos of results/graphs</a:t>
             </a:r>
           </a:p>
         </p:txBody>
@@ -4203,7 +4367,7 @@
     </p:spTree>
     <p:extLst>
       <p:ext uri="{BB962C8B-B14F-4D97-AF65-F5344CB8AC3E}">
-        <p14:creationId xmlns:p14="http://schemas.microsoft.com/office/powerpoint/2010/main" val="35176548"/>
+        <p14:creationId xmlns:p14="http://schemas.microsoft.com/office/powerpoint/2010/main" xmlns="" val="2640203804"/>
       </p:ext>
     </p:extLst>
   </p:cSld>
@@ -4235,7 +4399,7 @@
           <p:cNvPr id="2" name="Title 1">
             <a:extLst>
               <a:ext uri="{FF2B5EF4-FFF2-40B4-BE49-F238E27FC236}">
-                <a16:creationId xmlns:a16="http://schemas.microsoft.com/office/drawing/2014/main" id="{D1C37159-15C6-4032-9410-A6DBF1B9B67B}"/>
+                <a16:creationId xmlns:a16="http://schemas.microsoft.com/office/drawing/2014/main" xmlns="" id="{AB7A110D-5D02-464D-912A-94576CF1FA0B}"/>
               </a:ext>
             </a:extLst>
           </p:cNvPr>
@@ -4253,17 +4417,17 @@
           <a:p>
             <a:r>
               <a:rPr lang="en-US" dirty="0"/>
-              <a:t>Discussion</a:t>
-            </a:r>
-          </a:p>
-        </p:txBody>
-      </p:sp>
-      <p:sp>
-        <p:nvSpPr>
-          <p:cNvPr id="3" name="Content Placeholder 2">
+              <a:t>Results</a:t>
+            </a:r>
+          </a:p>
+        </p:txBody>
+      </p:sp>
+      <p:sp>
+        <p:nvSpPr>
+          <p:cNvPr id="4" name="Text Placeholder 3">
             <a:extLst>
               <a:ext uri="{FF2B5EF4-FFF2-40B4-BE49-F238E27FC236}">
-                <a16:creationId xmlns:a16="http://schemas.microsoft.com/office/drawing/2014/main" id="{19DCE3E2-E331-4D8F-9743-32581FA9C701}"/>
+                <a16:creationId xmlns:a16="http://schemas.microsoft.com/office/drawing/2014/main" xmlns="" id="{FEABBEBC-4034-44D7-AD06-F05034F5C7FF}"/>
               </a:ext>
             </a:extLst>
           </p:cNvPr>
@@ -4271,31 +4435,6 @@
             <a:spLocks noGrp="1"/>
           </p:cNvSpPr>
           <p:nvPr>
-            <p:ph idx="1"/>
-          </p:nvPr>
-        </p:nvSpPr>
-        <p:spPr/>
-        <p:txBody>
-          <a:bodyPr/>
-          <a:lstStyle/>
-          <a:p>
-            <a:endParaRPr lang="en-US"/>
-          </a:p>
-        </p:txBody>
-      </p:sp>
-      <p:sp>
-        <p:nvSpPr>
-          <p:cNvPr id="4" name="Text Placeholder 3">
-            <a:extLst>
-              <a:ext uri="{FF2B5EF4-FFF2-40B4-BE49-F238E27FC236}">
-                <a16:creationId xmlns:a16="http://schemas.microsoft.com/office/drawing/2014/main" id="{9CF72C30-7A32-4BDB-B0E9-659BBD6E2D1E}"/>
-              </a:ext>
-            </a:extLst>
-          </p:cNvPr>
-          <p:cNvSpPr>
-            <a:spLocks noGrp="1"/>
-          </p:cNvSpPr>
-          <p:nvPr>
             <p:ph type="body" sz="half" idx="2"/>
           </p:nvPr>
         </p:nvSpPr>
@@ -4306,7 +4445,7 @@
           <a:p>
             <a:r>
               <a:rPr lang="en-US" dirty="0"/>
-              <a:t>Photos to go along with discussion</a:t>
+              <a:t>Photos of larvae</a:t>
             </a:r>
           </a:p>
         </p:txBody>
@@ -4314,7 +4453,7 @@
     </p:spTree>
     <p:extLst>
       <p:ext uri="{BB962C8B-B14F-4D97-AF65-F5344CB8AC3E}">
-        <p14:creationId xmlns:p14="http://schemas.microsoft.com/office/powerpoint/2010/main" val="766928470"/>
+        <p14:creationId xmlns:p14="http://schemas.microsoft.com/office/powerpoint/2010/main" xmlns="" val="2484200750"/>
       </p:ext>
     </p:extLst>
   </p:cSld>
@@ -4346,7 +4485,7 @@
           <p:cNvPr id="2" name="Title 1">
             <a:extLst>
               <a:ext uri="{FF2B5EF4-FFF2-40B4-BE49-F238E27FC236}">
-                <a16:creationId xmlns:a16="http://schemas.microsoft.com/office/drawing/2014/main" id="{A0ABE963-C9D6-4D5F-896F-876FAC1BC59B}"/>
+                <a16:creationId xmlns:a16="http://schemas.microsoft.com/office/drawing/2014/main" xmlns="" id="{C566A25D-02C2-4A5E-B6B7-66AFCD7A7217}"/>
               </a:ext>
             </a:extLst>
           </p:cNvPr>
@@ -4364,7 +4503,7 @@
           <a:p>
             <a:r>
               <a:rPr lang="en-US" dirty="0"/>
-              <a:t>Conclusion</a:t>
+              <a:t>Discussion</a:t>
             </a:r>
           </a:p>
         </p:txBody>
@@ -4374,7 +4513,7 @@
           <p:cNvPr id="3" name="Content Placeholder 2">
             <a:extLst>
               <a:ext uri="{FF2B5EF4-FFF2-40B4-BE49-F238E27FC236}">
-                <a16:creationId xmlns:a16="http://schemas.microsoft.com/office/drawing/2014/main" id="{2B5DCD51-8E7E-4CAE-A8F6-58459FE0B0A2}"/>
+                <a16:creationId xmlns:a16="http://schemas.microsoft.com/office/drawing/2014/main" xmlns="" id="{FB1BCA34-A1AC-4452-85FD-9FBF108631F1}"/>
               </a:ext>
             </a:extLst>
           </p:cNvPr>
@@ -4390,14 +4529,87 @@
           <a:bodyPr/>
           <a:lstStyle/>
           <a:p>
-            <a:endParaRPr lang="en-US"/>
+            <a:pPr>
+              <a:buFont typeface="Courier New" panose="02070309020205020404" pitchFamily="49" charset="0"/>
+              <a:buChar char="o"/>
+            </a:pPr>
+            <a:r>
+              <a:rPr lang="en-US" dirty="0"/>
+              <a:t>Applications of results</a:t>
+            </a:r>
+          </a:p>
+          <a:p>
+            <a:pPr lvl="1">
+              <a:buFont typeface="Courier New" panose="02070309020205020404" pitchFamily="49" charset="0"/>
+              <a:buChar char="o"/>
+            </a:pPr>
+            <a:r>
+              <a:rPr lang="en-US" dirty="0"/>
+              <a:t>More efficient pest management systems</a:t>
+            </a:r>
+          </a:p>
+          <a:p>
+            <a:pPr lvl="1">
+              <a:buFont typeface="Courier New" panose="02070309020205020404" pitchFamily="49" charset="0"/>
+              <a:buChar char="o"/>
+            </a:pPr>
+            <a:r>
+              <a:rPr lang="en-US" dirty="0"/>
+              <a:t>Compensation for crop </a:t>
+            </a:r>
+            <a:r>
+              <a:rPr lang="en-US" dirty="0" smtClean="0"/>
+              <a:t>loss</a:t>
+            </a:r>
+          </a:p>
+          <a:p>
+            <a:pPr lvl="1">
+              <a:buFont typeface="Courier New" panose="02070309020205020404" pitchFamily="49" charset="0"/>
+              <a:buChar char="o"/>
+            </a:pPr>
+            <a:endParaRPr lang="en-US" dirty="0" smtClean="0"/>
+          </a:p>
+          <a:p>
+            <a:pPr>
+              <a:buFont typeface="Courier New" panose="02070309020205020404" pitchFamily="49" charset="0"/>
+              <a:buChar char="o"/>
+            </a:pPr>
+            <a:r>
+              <a:rPr lang="en-US" dirty="0" smtClean="0"/>
+              <a:t>Edits:</a:t>
+            </a:r>
+          </a:p>
+          <a:p>
+            <a:pPr lvl="1">
+              <a:buFont typeface="Courier New" panose="02070309020205020404" pitchFamily="49" charset="0"/>
+              <a:buChar char="o"/>
+            </a:pPr>
+            <a:r>
+              <a:rPr lang="en-US" dirty="0" smtClean="0"/>
+              <a:t>Please be specific: what specific pest management systems does this apply to?</a:t>
+            </a:r>
+          </a:p>
+          <a:p>
+            <a:pPr lvl="1">
+              <a:buFont typeface="Courier New" panose="02070309020205020404" pitchFamily="49" charset="0"/>
+              <a:buChar char="o"/>
+            </a:pPr>
+            <a:r>
+              <a:rPr lang="en-US" dirty="0" smtClean="0"/>
+              <a:t>How does </a:t>
+            </a:r>
+            <a:r>
+              <a:rPr lang="en-US" smtClean="0"/>
+              <a:t>one compensate for crop loss?</a:t>
+            </a:r>
+            <a:endParaRPr lang="en-US" dirty="0"/>
           </a:p>
         </p:txBody>
       </p:sp>
     </p:spTree>
     <p:extLst>
       <p:ext uri="{BB962C8B-B14F-4D97-AF65-F5344CB8AC3E}">
-        <p14:creationId xmlns:p14="http://schemas.microsoft.com/office/powerpoint/2010/main" val="603522605"/>
+        <p14:creationId xmlns:p14="http://schemas.microsoft.com/office/powerpoint/2010/main" xmlns="" val="35176548"/>
       </p:ext>
     </p:extLst>
   </p:cSld>
@@ -4429,7 +4641,7 @@
           <p:cNvPr id="2" name="Title 1">
             <a:extLst>
               <a:ext uri="{FF2B5EF4-FFF2-40B4-BE49-F238E27FC236}">
-                <a16:creationId xmlns:a16="http://schemas.microsoft.com/office/drawing/2014/main" id="{AEB269C9-E0AF-4653-B058-AF7DEF4886D0}"/>
+                <a16:creationId xmlns:a16="http://schemas.microsoft.com/office/drawing/2014/main" xmlns="" id="{D1C37159-15C6-4032-9410-A6DBF1B9B67B}"/>
               </a:ext>
             </a:extLst>
           </p:cNvPr>
@@ -4442,6 +4654,217 @@
         </p:nvSpPr>
         <p:spPr/>
         <p:txBody>
+          <a:bodyPr/>
+          <a:lstStyle/>
+          <a:p>
+            <a:r>
+              <a:rPr lang="en-US" dirty="0"/>
+              <a:t>Discussion</a:t>
+            </a:r>
+          </a:p>
+        </p:txBody>
+      </p:sp>
+      <p:sp>
+        <p:nvSpPr>
+          <p:cNvPr id="3" name="Content Placeholder 2">
+            <a:extLst>
+              <a:ext uri="{FF2B5EF4-FFF2-40B4-BE49-F238E27FC236}">
+                <a16:creationId xmlns:a16="http://schemas.microsoft.com/office/drawing/2014/main" xmlns="" id="{19DCE3E2-E331-4D8F-9743-32581FA9C701}"/>
+              </a:ext>
+            </a:extLst>
+          </p:cNvPr>
+          <p:cNvSpPr>
+            <a:spLocks noGrp="1"/>
+          </p:cNvSpPr>
+          <p:nvPr>
+            <p:ph idx="1"/>
+          </p:nvPr>
+        </p:nvSpPr>
+        <p:spPr/>
+        <p:txBody>
+          <a:bodyPr/>
+          <a:lstStyle/>
+          <a:p>
+            <a:endParaRPr lang="en-US"/>
+          </a:p>
+        </p:txBody>
+      </p:sp>
+      <p:sp>
+        <p:nvSpPr>
+          <p:cNvPr id="4" name="Text Placeholder 3">
+            <a:extLst>
+              <a:ext uri="{FF2B5EF4-FFF2-40B4-BE49-F238E27FC236}">
+                <a16:creationId xmlns:a16="http://schemas.microsoft.com/office/drawing/2014/main" xmlns="" id="{9CF72C30-7A32-4BDB-B0E9-659BBD6E2D1E}"/>
+              </a:ext>
+            </a:extLst>
+          </p:cNvPr>
+          <p:cNvSpPr>
+            <a:spLocks noGrp="1"/>
+          </p:cNvSpPr>
+          <p:nvPr>
+            <p:ph type="body" sz="half" idx="2"/>
+          </p:nvPr>
+        </p:nvSpPr>
+        <p:spPr/>
+        <p:txBody>
+          <a:bodyPr/>
+          <a:lstStyle/>
+          <a:p>
+            <a:r>
+              <a:rPr lang="en-US" dirty="0"/>
+              <a:t>Photos to go along with discussion</a:t>
+            </a:r>
+          </a:p>
+        </p:txBody>
+      </p:sp>
+    </p:spTree>
+    <p:extLst>
+      <p:ext uri="{BB962C8B-B14F-4D97-AF65-F5344CB8AC3E}">
+        <p14:creationId xmlns:p14="http://schemas.microsoft.com/office/powerpoint/2010/main" xmlns="" val="766928470"/>
+      </p:ext>
+    </p:extLst>
+  </p:cSld>
+  <p:clrMapOvr>
+    <a:masterClrMapping/>
+  </p:clrMapOvr>
+</p:sld>
+</file>
+
+<file path=ppt/slides/slide16.xml><?xml version="1.0" encoding="utf-8"?>
+<p:sld xmlns:a="http://schemas.openxmlformats.org/drawingml/2006/main" xmlns:r="http://schemas.openxmlformats.org/officeDocument/2006/relationships" xmlns:p="http://schemas.openxmlformats.org/presentationml/2006/main">
+  <p:cSld>
+    <p:spTree>
+      <p:nvGrpSpPr>
+        <p:cNvPr id="1" name=""/>
+        <p:cNvGrpSpPr/>
+        <p:nvPr/>
+      </p:nvGrpSpPr>
+      <p:grpSpPr>
+        <a:xfrm>
+          <a:off x="0" y="0"/>
+          <a:ext cx="0" cy="0"/>
+          <a:chOff x="0" y="0"/>
+          <a:chExt cx="0" cy="0"/>
+        </a:xfrm>
+      </p:grpSpPr>
+      <p:sp>
+        <p:nvSpPr>
+          <p:cNvPr id="2" name="Title 1">
+            <a:extLst>
+              <a:ext uri="{FF2B5EF4-FFF2-40B4-BE49-F238E27FC236}">
+                <a16:creationId xmlns:a16="http://schemas.microsoft.com/office/drawing/2014/main" xmlns="" id="{A0ABE963-C9D6-4D5F-896F-876FAC1BC59B}"/>
+              </a:ext>
+            </a:extLst>
+          </p:cNvPr>
+          <p:cNvSpPr>
+            <a:spLocks noGrp="1"/>
+          </p:cNvSpPr>
+          <p:nvPr>
+            <p:ph type="title"/>
+          </p:nvPr>
+        </p:nvSpPr>
+        <p:spPr/>
+        <p:txBody>
+          <a:bodyPr/>
+          <a:lstStyle/>
+          <a:p>
+            <a:r>
+              <a:rPr lang="en-US" dirty="0"/>
+              <a:t>Conclusion</a:t>
+            </a:r>
+          </a:p>
+        </p:txBody>
+      </p:sp>
+      <p:sp>
+        <p:nvSpPr>
+          <p:cNvPr id="3" name="Content Placeholder 2">
+            <a:extLst>
+              <a:ext uri="{FF2B5EF4-FFF2-40B4-BE49-F238E27FC236}">
+                <a16:creationId xmlns:a16="http://schemas.microsoft.com/office/drawing/2014/main" xmlns="" id="{2B5DCD51-8E7E-4CAE-A8F6-58459FE0B0A2}"/>
+              </a:ext>
+            </a:extLst>
+          </p:cNvPr>
+          <p:cNvSpPr>
+            <a:spLocks noGrp="1"/>
+          </p:cNvSpPr>
+          <p:nvPr>
+            <p:ph idx="1"/>
+          </p:nvPr>
+        </p:nvSpPr>
+        <p:spPr/>
+        <p:txBody>
+          <a:bodyPr/>
+          <a:lstStyle/>
+          <a:p>
+            <a:r>
+              <a:rPr lang="en-US" dirty="0" smtClean="0"/>
+              <a:t>Edits: </a:t>
+            </a:r>
+          </a:p>
+          <a:p>
+            <a:pPr lvl="1"/>
+            <a:r>
+              <a:rPr lang="en-US" dirty="0" smtClean="0"/>
+              <a:t>What do you conclude?</a:t>
+            </a:r>
+          </a:p>
+          <a:p>
+            <a:pPr lvl="1"/>
+            <a:r>
+              <a:rPr lang="en-US" dirty="0" smtClean="0"/>
+              <a:t>Improvements in data collection? Holes in data set (what can’t we see with this data)? What future experiments do you propose now that we have these results?</a:t>
+            </a:r>
+          </a:p>
+        </p:txBody>
+      </p:sp>
+    </p:spTree>
+    <p:extLst>
+      <p:ext uri="{BB962C8B-B14F-4D97-AF65-F5344CB8AC3E}">
+        <p14:creationId xmlns:p14="http://schemas.microsoft.com/office/powerpoint/2010/main" xmlns="" val="603522605"/>
+      </p:ext>
+    </p:extLst>
+  </p:cSld>
+  <p:clrMapOvr>
+    <a:masterClrMapping/>
+  </p:clrMapOvr>
+</p:sld>
+</file>
+
+<file path=ppt/slides/slide17.xml><?xml version="1.0" encoding="utf-8"?>
+<p:sld xmlns:a="http://schemas.openxmlformats.org/drawingml/2006/main" xmlns:r="http://schemas.openxmlformats.org/officeDocument/2006/relationships" xmlns:p="http://schemas.openxmlformats.org/presentationml/2006/main">
+  <p:cSld>
+    <p:spTree>
+      <p:nvGrpSpPr>
+        <p:cNvPr id="1" name=""/>
+        <p:cNvGrpSpPr/>
+        <p:nvPr/>
+      </p:nvGrpSpPr>
+      <p:grpSpPr>
+        <a:xfrm>
+          <a:off x="0" y="0"/>
+          <a:ext cx="0" cy="0"/>
+          <a:chOff x="0" y="0"/>
+          <a:chExt cx="0" cy="0"/>
+        </a:xfrm>
+      </p:grpSpPr>
+      <p:sp>
+        <p:nvSpPr>
+          <p:cNvPr id="2" name="Title 1">
+            <a:extLst>
+              <a:ext uri="{FF2B5EF4-FFF2-40B4-BE49-F238E27FC236}">
+                <a16:creationId xmlns:a16="http://schemas.microsoft.com/office/drawing/2014/main" xmlns="" id="{AEB269C9-E0AF-4653-B058-AF7DEF4886D0}"/>
+              </a:ext>
+            </a:extLst>
+          </p:cNvPr>
+          <p:cNvSpPr>
+            <a:spLocks noGrp="1"/>
+          </p:cNvSpPr>
+          <p:nvPr>
+            <p:ph type="title"/>
+          </p:nvPr>
+        </p:nvSpPr>
+        <p:spPr/>
+        <p:txBody>
           <a:bodyPr>
             <a:normAutofit/>
           </a:bodyPr>
@@ -4459,7 +4882,7 @@
           <p:cNvPr id="3" name="Content Placeholder 2">
             <a:extLst>
               <a:ext uri="{FF2B5EF4-FFF2-40B4-BE49-F238E27FC236}">
-                <a16:creationId xmlns:a16="http://schemas.microsoft.com/office/drawing/2014/main" id="{DBC5FC35-51A7-4D53-A59F-7B3D6E4CEA06}"/>
+                <a16:creationId xmlns:a16="http://schemas.microsoft.com/office/drawing/2014/main" xmlns="" id="{DBC5FC35-51A7-4D53-A59F-7B3D6E4CEA06}"/>
               </a:ext>
             </a:extLst>
           </p:cNvPr>
@@ -4484,7 +4907,7 @@
           <p:cNvPr id="4" name="Text Placeholder 3">
             <a:extLst>
               <a:ext uri="{FF2B5EF4-FFF2-40B4-BE49-F238E27FC236}">
-                <a16:creationId xmlns:a16="http://schemas.microsoft.com/office/drawing/2014/main" id="{EF6B7F87-4603-441A-BF92-253D5D4D695D}"/>
+                <a16:creationId xmlns:a16="http://schemas.microsoft.com/office/drawing/2014/main" xmlns="" id="{EF6B7F87-4603-441A-BF92-253D5D4D695D}"/>
               </a:ext>
             </a:extLst>
           </p:cNvPr>
@@ -4507,7 +4930,7 @@
     </p:spTree>
     <p:extLst>
       <p:ext uri="{BB962C8B-B14F-4D97-AF65-F5344CB8AC3E}">
-        <p14:creationId xmlns:p14="http://schemas.microsoft.com/office/powerpoint/2010/main" val="2470456505"/>
+        <p14:creationId xmlns:p14="http://schemas.microsoft.com/office/powerpoint/2010/main" xmlns="" val="2470456505"/>
       </p:ext>
     </p:extLst>
   </p:cSld>
@@ -4536,13 +4959,7 @@
       </p:grpSpPr>
       <p:sp>
         <p:nvSpPr>
-          <p:cNvPr id="2" name="Title 1">
-            <a:extLst>
-              <a:ext uri="{FF2B5EF4-FFF2-40B4-BE49-F238E27FC236}">
-                <a16:creationId xmlns:a16="http://schemas.microsoft.com/office/drawing/2014/main" id="{148E1673-4AD9-42CC-B48E-8E5F65C51BF3}"/>
-              </a:ext>
-            </a:extLst>
-          </p:cNvPr>
+          <p:cNvPr id="2" name="Title 1"/>
           <p:cNvSpPr>
             <a:spLocks noGrp="1"/>
           </p:cNvSpPr>
@@ -4556,21 +4973,16 @@
           <a:lstStyle/>
           <a:p>
             <a:r>
-              <a:rPr lang="en-US" dirty="0"/>
-              <a:t>Background</a:t>
-            </a:r>
-          </a:p>
-        </p:txBody>
-      </p:sp>
-      <p:sp>
-        <p:nvSpPr>
-          <p:cNvPr id="3" name="Content Placeholder 2">
-            <a:extLst>
-              <a:ext uri="{FF2B5EF4-FFF2-40B4-BE49-F238E27FC236}">
-                <a16:creationId xmlns:a16="http://schemas.microsoft.com/office/drawing/2014/main" id="{B286B120-0BD2-4018-A97D-E2E15BC2167E}"/>
-              </a:ext>
-            </a:extLst>
-          </p:cNvPr>
+              <a:rPr lang="en-US" dirty="0" smtClean="0"/>
+              <a:t>Pitch/Hook Slide</a:t>
+            </a:r>
+            <a:endParaRPr lang="en-US" dirty="0"/>
+          </a:p>
+        </p:txBody>
+      </p:sp>
+      <p:sp>
+        <p:nvSpPr>
+          <p:cNvPr id="3" name="Content Placeholder 2"/>
           <p:cNvSpPr>
             <a:spLocks noGrp="1"/>
           </p:cNvSpPr>
@@ -4583,80 +4995,14 @@
           <a:bodyPr/>
           <a:lstStyle/>
           <a:p>
-            <a:pPr>
-              <a:buFont typeface="Courier New" panose="02070309020205020404" pitchFamily="49" charset="0"/>
-              <a:buChar char="o"/>
-            </a:pPr>
-            <a:r>
-              <a:rPr lang="en-US" dirty="0"/>
-              <a:t>European corn borer is a primary pest of agricultural corn</a:t>
-            </a:r>
-          </a:p>
-          <a:p>
-            <a:pPr>
-              <a:buFont typeface="Courier New" panose="02070309020205020404" pitchFamily="49" charset="0"/>
-              <a:buChar char="o"/>
-            </a:pPr>
-            <a:r>
-              <a:rPr lang="en-US" dirty="0"/>
-              <a:t>Approximately $1 billion in yield-related loss</a:t>
-            </a:r>
-          </a:p>
-          <a:p>
-            <a:pPr>
-              <a:buFont typeface="Courier New" panose="02070309020205020404" pitchFamily="49" charset="0"/>
-              <a:buChar char="o"/>
-            </a:pPr>
-            <a:r>
-              <a:rPr lang="en-US" dirty="0"/>
-              <a:t>Two strains of European corn borer</a:t>
-            </a:r>
-          </a:p>
-          <a:p>
-            <a:pPr lvl="1">
-              <a:buFont typeface="Courier New" panose="02070309020205020404" pitchFamily="49" charset="0"/>
-              <a:buChar char="o"/>
-            </a:pPr>
-            <a:r>
-              <a:rPr lang="en-US" dirty="0" err="1"/>
-              <a:t>Univoltine</a:t>
-            </a:r>
-            <a:r>
-              <a:rPr lang="en-US" dirty="0"/>
-              <a:t> (UZ) vs. Bivoltine (BE)</a:t>
-            </a:r>
-          </a:p>
-          <a:p>
-            <a:pPr lvl="1">
-              <a:buFont typeface="Courier New" panose="02070309020205020404" pitchFamily="49" charset="0"/>
-              <a:buChar char="o"/>
-            </a:pPr>
-            <a:r>
-              <a:rPr lang="en-US" dirty="0"/>
-              <a:t>Different diapause lengths (12:12, 16:8)</a:t>
-            </a:r>
-          </a:p>
-          <a:p>
-            <a:pPr marL="201168" lvl="1" indent="0">
-              <a:buNone/>
-            </a:pPr>
-            <a:endParaRPr lang="en-US" dirty="0"/>
-          </a:p>
-          <a:p>
-            <a:pPr>
-              <a:buFont typeface="Courier New" panose="02070309020205020404" pitchFamily="49" charset="0"/>
-              <a:buChar char="o"/>
-            </a:pPr>
-            <a:endParaRPr lang="en-US" dirty="0"/>
+            <a:r>
+              <a:rPr lang="en-US" dirty="0" smtClean="0"/>
+              <a:t>Please include a pitch. Explain why this insect, this project, and this approach is important</a:t>
+            </a:r>
           </a:p>
         </p:txBody>
       </p:sp>
     </p:spTree>
-    <p:extLst>
-      <p:ext uri="{BB962C8B-B14F-4D97-AF65-F5344CB8AC3E}">
-        <p14:creationId xmlns:p14="http://schemas.microsoft.com/office/powerpoint/2010/main" val="3625831648"/>
-      </p:ext>
-    </p:extLst>
   </p:cSld>
   <p:clrMapOvr>
     <a:masterClrMapping/>
@@ -4686,7 +5032,7 @@
           <p:cNvPr id="2" name="Title 1">
             <a:extLst>
               <a:ext uri="{FF2B5EF4-FFF2-40B4-BE49-F238E27FC236}">
-                <a16:creationId xmlns:a16="http://schemas.microsoft.com/office/drawing/2014/main" id="{5326D36C-F6EC-49ED-9F3C-8B7141CFF748}"/>
+                <a16:creationId xmlns:a16="http://schemas.microsoft.com/office/drawing/2014/main" xmlns="" id="{148E1673-4AD9-42CC-B48E-8E5F65C51BF3}"/>
               </a:ext>
             </a:extLst>
           </p:cNvPr>
@@ -4711,10 +5057,10 @@
       </p:sp>
       <p:sp>
         <p:nvSpPr>
-          <p:cNvPr id="4" name="Text Placeholder 3">
+          <p:cNvPr id="3" name="Content Placeholder 2">
             <a:extLst>
               <a:ext uri="{FF2B5EF4-FFF2-40B4-BE49-F238E27FC236}">
-                <a16:creationId xmlns:a16="http://schemas.microsoft.com/office/drawing/2014/main" id="{5A90C9E4-AA4C-4950-8A83-7B521BC7B8DC}"/>
+                <a16:creationId xmlns:a16="http://schemas.microsoft.com/office/drawing/2014/main" xmlns="" id="{B286B120-0BD2-4018-A97D-E2E15BC2167E}"/>
               </a:ext>
             </a:extLst>
           </p:cNvPr>
@@ -4722,25 +5068,131 @@
             <a:spLocks noGrp="1"/>
           </p:cNvSpPr>
           <p:nvPr>
-            <p:ph type="body" sz="half" idx="2"/>
-          </p:nvPr>
-        </p:nvSpPr>
-        <p:spPr/>
-        <p:txBody>
-          <a:bodyPr/>
-          <a:lstStyle/>
-          <a:p>
+            <p:ph idx="1"/>
+          </p:nvPr>
+        </p:nvSpPr>
+        <p:spPr/>
+        <p:txBody>
+          <a:bodyPr/>
+          <a:lstStyle/>
+          <a:p>
+            <a:pPr>
+              <a:buFont typeface="Courier New" panose="02070309020205020404" pitchFamily="49" charset="0"/>
+              <a:buChar char="o"/>
+            </a:pPr>
             <a:r>
               <a:rPr lang="en-US" dirty="0"/>
-              <a:t>Photos of larvae with captions</a:t>
-            </a:r>
+              <a:t>European corn borer is a primary pest of agricultural corn</a:t>
+            </a:r>
+          </a:p>
+          <a:p>
+            <a:pPr>
+              <a:buFont typeface="Courier New" panose="02070309020205020404" pitchFamily="49" charset="0"/>
+              <a:buChar char="o"/>
+            </a:pPr>
+            <a:r>
+              <a:rPr lang="en-US" dirty="0"/>
+              <a:t>Approximately $1 billion in yield-related loss</a:t>
+            </a:r>
+          </a:p>
+          <a:p>
+            <a:pPr>
+              <a:buFont typeface="Courier New" panose="02070309020205020404" pitchFamily="49" charset="0"/>
+              <a:buChar char="o"/>
+            </a:pPr>
+            <a:r>
+              <a:rPr lang="en-US" dirty="0"/>
+              <a:t>Two strains of European corn borer</a:t>
+            </a:r>
+          </a:p>
+          <a:p>
+            <a:pPr lvl="1">
+              <a:buFont typeface="Courier New" panose="02070309020205020404" pitchFamily="49" charset="0"/>
+              <a:buChar char="o"/>
+            </a:pPr>
+            <a:r>
+              <a:rPr lang="en-US" dirty="0" err="1"/>
+              <a:t>Univoltine</a:t>
+            </a:r>
+            <a:r>
+              <a:rPr lang="en-US" dirty="0"/>
+              <a:t> (UZ) vs. Bivoltine (BE)</a:t>
+            </a:r>
+          </a:p>
+          <a:p>
+            <a:pPr lvl="1">
+              <a:buFont typeface="Courier New" panose="02070309020205020404" pitchFamily="49" charset="0"/>
+              <a:buChar char="o"/>
+            </a:pPr>
+            <a:r>
+              <a:rPr lang="en-US" dirty="0"/>
+              <a:t>Different diapause lengths (12:12, </a:t>
+            </a:r>
+            <a:r>
+              <a:rPr lang="en-US" dirty="0" smtClean="0"/>
+              <a:t>16:8)</a:t>
+            </a:r>
+          </a:p>
+          <a:p>
+            <a:pPr>
+              <a:buFont typeface="Courier New" panose="02070309020205020404" pitchFamily="49" charset="0"/>
+              <a:buChar char="o"/>
+            </a:pPr>
+            <a:r>
+              <a:rPr lang="en-US" dirty="0" smtClean="0"/>
+              <a:t>Edits:</a:t>
+            </a:r>
+          </a:p>
+          <a:p>
+            <a:pPr lvl="1">
+              <a:buFont typeface="Courier New" panose="02070309020205020404" pitchFamily="49" charset="0"/>
+              <a:buChar char="o"/>
+            </a:pPr>
+            <a:r>
+              <a:rPr lang="en-US" dirty="0" smtClean="0"/>
+              <a:t>This slide needs to include information about the importance/history of </a:t>
+            </a:r>
+            <a:r>
+              <a:rPr lang="en-US" b="1" u="sng" dirty="0" smtClean="0"/>
+              <a:t>ECB and diapause</a:t>
+            </a:r>
+          </a:p>
+          <a:p>
+            <a:pPr lvl="1">
+              <a:buFont typeface="Courier New" panose="02070309020205020404" pitchFamily="49" charset="0"/>
+              <a:buChar char="o"/>
+            </a:pPr>
+            <a:r>
+              <a:rPr lang="en-US" dirty="0" smtClean="0"/>
+              <a:t>This slide need to include information on the importance/history of digestive efficiency and testing it.</a:t>
+            </a:r>
+          </a:p>
+          <a:p>
+            <a:pPr lvl="1">
+              <a:buFont typeface="Courier New" panose="02070309020205020404" pitchFamily="49" charset="0"/>
+              <a:buChar char="o"/>
+            </a:pPr>
+            <a:endParaRPr lang="en-US" dirty="0"/>
+          </a:p>
+          <a:p>
+            <a:pPr marL="201168" lvl="1" indent="0">
+              <a:buNone/>
+            </a:pPr>
+            <a:endParaRPr lang="en-US" dirty="0"/>
+          </a:p>
+          <a:p>
+            <a:pPr>
+              <a:buFont typeface="Courier New" panose="02070309020205020404" pitchFamily="49" charset="0"/>
+              <a:buChar char="o"/>
+            </a:pPr>
+            <a:endParaRPr lang="en-US" dirty="0"/>
           </a:p>
         </p:txBody>
       </p:sp>
     </p:spTree>
     <p:extLst>
       <p:ext uri="{BB962C8B-B14F-4D97-AF65-F5344CB8AC3E}">
-        <p14:creationId xmlns:p14="http://schemas.microsoft.com/office/powerpoint/2010/main" val="1772544796"/>
+        <p14:creationId xmlns:p14="http://schemas.microsoft.com/office/powerpoint/2010/main" xmlns="" val="3625831648"/>
       </p:ext>
     </p:extLst>
   </p:cSld>
@@ -4772,7 +5224,7 @@
           <p:cNvPr id="2" name="Title 1">
             <a:extLst>
               <a:ext uri="{FF2B5EF4-FFF2-40B4-BE49-F238E27FC236}">
-                <a16:creationId xmlns:a16="http://schemas.microsoft.com/office/drawing/2014/main" id="{AD17E2D2-9481-4213-BD9E-D873FD308122}"/>
+                <a16:creationId xmlns:a16="http://schemas.microsoft.com/office/drawing/2014/main" xmlns="" id="{5326D36C-F6EC-49ED-9F3C-8B7141CFF748}"/>
               </a:ext>
             </a:extLst>
           </p:cNvPr>
@@ -4790,17 +5242,17 @@
           <a:p>
             <a:r>
               <a:rPr lang="en-US" dirty="0"/>
-              <a:t>Methodology</a:t>
-            </a:r>
-          </a:p>
-        </p:txBody>
-      </p:sp>
-      <p:sp>
-        <p:nvSpPr>
-          <p:cNvPr id="3" name="Content Placeholder 2">
+              <a:t>Background</a:t>
+            </a:r>
+          </a:p>
+        </p:txBody>
+      </p:sp>
+      <p:sp>
+        <p:nvSpPr>
+          <p:cNvPr id="4" name="Text Placeholder 3">
             <a:extLst>
               <a:ext uri="{FF2B5EF4-FFF2-40B4-BE49-F238E27FC236}">
-                <a16:creationId xmlns:a16="http://schemas.microsoft.com/office/drawing/2014/main" id="{C3D3343D-E716-4DD8-A2A1-118D12B8B47A}"/>
+                <a16:creationId xmlns:a16="http://schemas.microsoft.com/office/drawing/2014/main" xmlns="" id="{5A90C9E4-AA4C-4950-8A83-7B521BC7B8DC}"/>
               </a:ext>
             </a:extLst>
           </p:cNvPr>
@@ -4808,89 +5260,17 @@
             <a:spLocks noGrp="1"/>
           </p:cNvSpPr>
           <p:nvPr>
-            <p:ph sz="half" idx="1"/>
-          </p:nvPr>
-        </p:nvSpPr>
-        <p:spPr/>
-        <p:txBody>
-          <a:bodyPr/>
-          <a:lstStyle/>
-          <a:p>
-            <a:pPr>
-              <a:buFont typeface="Courier New" panose="02070309020205020404" pitchFamily="49" charset="0"/>
-              <a:buChar char="o"/>
-            </a:pPr>
-            <a:r>
-              <a:rPr lang="en-US" dirty="0" err="1"/>
-              <a:t>Folch</a:t>
-            </a:r>
+            <p:ph type="body" sz="half" idx="2"/>
+          </p:nvPr>
+        </p:nvSpPr>
+        <p:spPr/>
+        <p:txBody>
+          <a:bodyPr/>
+          <a:lstStyle/>
+          <a:p>
             <a:r>
               <a:rPr lang="en-US" dirty="0"/>
-              <a:t> Extraction Method</a:t>
-            </a:r>
-          </a:p>
-          <a:p>
-            <a:pPr lvl="1">
-              <a:buFont typeface="Courier New" panose="02070309020205020404" pitchFamily="49" charset="0"/>
-              <a:buChar char="o"/>
-            </a:pPr>
-            <a:r>
-              <a:rPr lang="en-US" dirty="0"/>
-              <a:t>Suspension of dried lipids in methanol</a:t>
-            </a:r>
-          </a:p>
-          <a:p>
-            <a:pPr lvl="1">
-              <a:buFont typeface="Courier New" panose="02070309020205020404" pitchFamily="49" charset="0"/>
-              <a:buChar char="o"/>
-            </a:pPr>
-            <a:r>
-              <a:rPr lang="en-US" dirty="0"/>
-              <a:t>Homogenization and centrifugation</a:t>
-            </a:r>
-          </a:p>
-          <a:p>
-            <a:pPr lvl="1">
-              <a:buFont typeface="Courier New" panose="02070309020205020404" pitchFamily="49" charset="0"/>
-              <a:buChar char="o"/>
-            </a:pPr>
-            <a:r>
-              <a:rPr lang="en-US" dirty="0"/>
-              <a:t>Removal of hexane-lipid layer</a:t>
-            </a:r>
-          </a:p>
-          <a:p>
-            <a:pPr marL="201168" lvl="1" indent="0">
-              <a:buNone/>
-            </a:pPr>
-            <a:endParaRPr lang="en-US" dirty="0"/>
-          </a:p>
-        </p:txBody>
-      </p:sp>
-      <p:sp>
-        <p:nvSpPr>
-          <p:cNvPr id="4" name="Content Placeholder 3">
-            <a:extLst>
-              <a:ext uri="{FF2B5EF4-FFF2-40B4-BE49-F238E27FC236}">
-                <a16:creationId xmlns:a16="http://schemas.microsoft.com/office/drawing/2014/main" id="{9E37E9A1-393E-453A-9BBC-5F6E6D2E0CF0}"/>
-              </a:ext>
-            </a:extLst>
-          </p:cNvPr>
-          <p:cNvSpPr>
-            <a:spLocks noGrp="1"/>
-          </p:cNvSpPr>
-          <p:nvPr>
-            <p:ph sz="half" idx="2"/>
-          </p:nvPr>
-        </p:nvSpPr>
-        <p:spPr/>
-        <p:txBody>
-          <a:bodyPr/>
-          <a:lstStyle/>
-          <a:p>
-            <a:r>
-              <a:rPr lang="en-US" dirty="0"/>
-              <a:t>Photos of extraction method</a:t>
+              <a:t>Photos of larvae with captions</a:t>
             </a:r>
           </a:p>
         </p:txBody>
@@ -4898,7 +5278,7 @@
     </p:spTree>
     <p:extLst>
       <p:ext uri="{BB962C8B-B14F-4D97-AF65-F5344CB8AC3E}">
-        <p14:creationId xmlns:p14="http://schemas.microsoft.com/office/powerpoint/2010/main" val="3419245638"/>
+        <p14:creationId xmlns:p14="http://schemas.microsoft.com/office/powerpoint/2010/main" xmlns="" val="1772544796"/>
       </p:ext>
     </p:extLst>
   </p:cSld>
@@ -4930,7 +5310,7 @@
           <p:cNvPr id="2" name="Title 1">
             <a:extLst>
               <a:ext uri="{FF2B5EF4-FFF2-40B4-BE49-F238E27FC236}">
-                <a16:creationId xmlns:a16="http://schemas.microsoft.com/office/drawing/2014/main" id="{61DE1189-037C-4FB3-83B7-B9DDC92DA6D6}"/>
+                <a16:creationId xmlns:a16="http://schemas.microsoft.com/office/drawing/2014/main" xmlns="" id="{AD17E2D2-9481-4213-BD9E-D873FD308122}"/>
               </a:ext>
             </a:extLst>
           </p:cNvPr>
@@ -4958,7 +5338,7 @@
           <p:cNvPr id="3" name="Content Placeholder 2">
             <a:extLst>
               <a:ext uri="{FF2B5EF4-FFF2-40B4-BE49-F238E27FC236}">
-                <a16:creationId xmlns:a16="http://schemas.microsoft.com/office/drawing/2014/main" id="{C90B1AE8-269E-47A3-A565-FD60F3E13FE8}"/>
+                <a16:creationId xmlns:a16="http://schemas.microsoft.com/office/drawing/2014/main" xmlns="" id="{C3D3343D-E716-4DD8-A2A1-118D12B8B47A}"/>
               </a:ext>
             </a:extLst>
           </p:cNvPr>
@@ -4966,24 +5346,129 @@
             <a:spLocks noGrp="1"/>
           </p:cNvSpPr>
           <p:nvPr>
-            <p:ph idx="1"/>
-          </p:nvPr>
-        </p:nvSpPr>
-        <p:spPr/>
-        <p:txBody>
-          <a:bodyPr/>
-          <a:lstStyle/>
-          <a:p>
-            <a:endParaRPr lang="en-US"/>
-          </a:p>
-        </p:txBody>
-      </p:sp>
-      <p:sp>
-        <p:nvSpPr>
-          <p:cNvPr id="4" name="Text Placeholder 3">
+            <p:ph sz="half" idx="1"/>
+          </p:nvPr>
+        </p:nvSpPr>
+        <p:spPr/>
+        <p:txBody>
+          <a:bodyPr>
+            <a:normAutofit lnSpcReduction="10000"/>
+          </a:bodyPr>
+          <a:lstStyle/>
+          <a:p>
+            <a:pPr>
+              <a:buFont typeface="Courier New" panose="02070309020205020404" pitchFamily="49" charset="0"/>
+              <a:buChar char="o"/>
+            </a:pPr>
+            <a:r>
+              <a:rPr lang="en-US" dirty="0" err="1"/>
+              <a:t>Folch</a:t>
+            </a:r>
+            <a:r>
+              <a:rPr lang="en-US" dirty="0"/>
+              <a:t> Extraction Method</a:t>
+            </a:r>
+          </a:p>
+          <a:p>
+            <a:pPr lvl="1">
+              <a:buFont typeface="Courier New" panose="02070309020205020404" pitchFamily="49" charset="0"/>
+              <a:buChar char="o"/>
+            </a:pPr>
+            <a:r>
+              <a:rPr lang="en-US" dirty="0"/>
+              <a:t>Suspension of dried lipids in methanol</a:t>
+            </a:r>
+          </a:p>
+          <a:p>
+            <a:pPr lvl="1">
+              <a:buFont typeface="Courier New" panose="02070309020205020404" pitchFamily="49" charset="0"/>
+              <a:buChar char="o"/>
+            </a:pPr>
+            <a:r>
+              <a:rPr lang="en-US" dirty="0"/>
+              <a:t>Homogenization and centrifugation</a:t>
+            </a:r>
+          </a:p>
+          <a:p>
+            <a:pPr lvl="1">
+              <a:buFont typeface="Courier New" panose="02070309020205020404" pitchFamily="49" charset="0"/>
+              <a:buChar char="o"/>
+            </a:pPr>
+            <a:r>
+              <a:rPr lang="en-US" dirty="0"/>
+              <a:t>Removal of hexane-lipid </a:t>
+            </a:r>
+            <a:r>
+              <a:rPr lang="en-US" dirty="0" smtClean="0"/>
+              <a:t>layer</a:t>
+            </a:r>
+          </a:p>
+          <a:p>
+            <a:pPr lvl="1">
+              <a:buFont typeface="Courier New" panose="02070309020205020404" pitchFamily="49" charset="0"/>
+              <a:buChar char="o"/>
+            </a:pPr>
+            <a:endParaRPr lang="en-US" dirty="0" smtClean="0"/>
+          </a:p>
+          <a:p>
+            <a:pPr lvl="1">
+              <a:buFont typeface="Courier New" panose="02070309020205020404" pitchFamily="49" charset="0"/>
+              <a:buChar char="o"/>
+            </a:pPr>
+            <a:endParaRPr lang="en-US" dirty="0" smtClean="0"/>
+          </a:p>
+          <a:p>
+            <a:pPr lvl="1">
+              <a:buNone/>
+            </a:pPr>
+            <a:r>
+              <a:rPr lang="en-US" dirty="0" smtClean="0"/>
+              <a:t>Edits JTB:</a:t>
+            </a:r>
+          </a:p>
+          <a:p>
+            <a:pPr lvl="1"/>
+            <a:r>
+              <a:rPr lang="en-US" dirty="0" smtClean="0"/>
+              <a:t>Try creating an info-graphic to explain methodology. It would remove the need for the wordy explanation and would get the point across quickly. </a:t>
+            </a:r>
+          </a:p>
+          <a:p>
+            <a:pPr lvl="1"/>
+            <a:r>
+              <a:rPr lang="en-US" dirty="0" smtClean="0"/>
+              <a:t>The bullets are technically incorrect. </a:t>
+            </a:r>
+          </a:p>
+          <a:p>
+            <a:pPr lvl="2"/>
+            <a:r>
+              <a:rPr lang="en-US" dirty="0" smtClean="0"/>
+              <a:t>“Dried lipids are not suspended in methanol.”</a:t>
+            </a:r>
+          </a:p>
+          <a:p>
+            <a:pPr lvl="2"/>
+            <a:r>
+              <a:rPr lang="en-US" dirty="0" smtClean="0"/>
+              <a:t>“Removal of hexane-lipid layer”</a:t>
+            </a:r>
+            <a:endParaRPr lang="en-US" dirty="0"/>
+          </a:p>
+          <a:p>
+            <a:pPr marL="201168" lvl="1" indent="0">
+              <a:buNone/>
+            </a:pPr>
+            <a:endParaRPr lang="en-US" dirty="0"/>
+          </a:p>
+        </p:txBody>
+      </p:sp>
+      <p:sp>
+        <p:nvSpPr>
+          <p:cNvPr id="4" name="Content Placeholder 3">
             <a:extLst>
               <a:ext uri="{FF2B5EF4-FFF2-40B4-BE49-F238E27FC236}">
-                <a16:creationId xmlns:a16="http://schemas.microsoft.com/office/drawing/2014/main" id="{A374C5C2-9800-4C61-B8B5-9E14824CE7F0}"/>
+                <a16:creationId xmlns:a16="http://schemas.microsoft.com/office/drawing/2014/main" xmlns="" id="{9E37E9A1-393E-453A-9BBC-5F6E6D2E0CF0}"/>
               </a:ext>
             </a:extLst>
           </p:cNvPr>
@@ -4991,29 +5476,19 @@
             <a:spLocks noGrp="1"/>
           </p:cNvSpPr>
           <p:nvPr>
-            <p:ph type="body" sz="half" idx="2"/>
-          </p:nvPr>
-        </p:nvSpPr>
-        <p:spPr/>
-        <p:txBody>
-          <a:bodyPr/>
+            <p:ph sz="half" idx="2"/>
+          </p:nvPr>
+        </p:nvSpPr>
+        <p:spPr/>
+        <p:txBody>
+          <a:bodyPr>
+            <a:normAutofit lnSpcReduction="10000"/>
+          </a:bodyPr>
           <a:lstStyle/>
           <a:p>
             <a:r>
               <a:rPr lang="en-US" dirty="0"/>
-              <a:t>Dilution information</a:t>
-            </a:r>
-          </a:p>
-          <a:p>
-            <a:r>
-              <a:rPr lang="en-US" dirty="0"/>
-              <a:t>FAMEs</a:t>
-            </a:r>
-          </a:p>
-          <a:p>
-            <a:r>
-              <a:rPr lang="en-US" dirty="0"/>
-              <a:t>Insect rearing</a:t>
+              <a:t>Photos of extraction method</a:t>
             </a:r>
           </a:p>
         </p:txBody>
@@ -5021,7 +5496,7 @@
     </p:spTree>
     <p:extLst>
       <p:ext uri="{BB962C8B-B14F-4D97-AF65-F5344CB8AC3E}">
-        <p14:creationId xmlns:p14="http://schemas.microsoft.com/office/powerpoint/2010/main" val="1452706979"/>
+        <p14:creationId xmlns:p14="http://schemas.microsoft.com/office/powerpoint/2010/main" xmlns="" val="3419245638"/>
       </p:ext>
     </p:extLst>
   </p:cSld>
@@ -5053,7 +5528,7 @@
           <p:cNvPr id="2" name="Title 1">
             <a:extLst>
               <a:ext uri="{FF2B5EF4-FFF2-40B4-BE49-F238E27FC236}">
-                <a16:creationId xmlns:a16="http://schemas.microsoft.com/office/drawing/2014/main" id="{041F9D61-CC37-4752-8CCC-4C49A0387096}"/>
+                <a16:creationId xmlns:a16="http://schemas.microsoft.com/office/drawing/2014/main" xmlns="" id="{61DE1189-037C-4FB3-83B7-B9DDC92DA6D6}"/>
               </a:ext>
             </a:extLst>
           </p:cNvPr>
@@ -5071,7 +5546,7 @@
           <a:p>
             <a:r>
               <a:rPr lang="en-US" dirty="0"/>
-              <a:t>Methodology- Insect Rearing</a:t>
+              <a:t>Methodology</a:t>
             </a:r>
           </a:p>
         </p:txBody>
@@ -5081,7 +5556,7 @@
           <p:cNvPr id="3" name="Content Placeholder 2">
             <a:extLst>
               <a:ext uri="{FF2B5EF4-FFF2-40B4-BE49-F238E27FC236}">
-                <a16:creationId xmlns:a16="http://schemas.microsoft.com/office/drawing/2014/main" id="{4BAAFEAC-835A-4EA4-A09A-B25590C38D95}"/>
+                <a16:creationId xmlns:a16="http://schemas.microsoft.com/office/drawing/2014/main" xmlns="" id="{C90B1AE8-269E-47A3-A565-FD60F3E13FE8}"/>
               </a:ext>
             </a:extLst>
           </p:cNvPr>
@@ -5097,23 +5572,50 @@
           <a:bodyPr/>
           <a:lstStyle/>
           <a:p>
-            <a:pPr>
-              <a:buFont typeface="Courier New" panose="02070309020205020404" pitchFamily="49" charset="0"/>
-              <a:buChar char="o"/>
-            </a:pPr>
+            <a:r>
+              <a:rPr lang="en-US" dirty="0" smtClean="0"/>
+              <a:t>Edits: compress this information into the one “methodology” slide</a:t>
+            </a:r>
+            <a:endParaRPr lang="en-US" dirty="0"/>
+          </a:p>
+        </p:txBody>
+      </p:sp>
+      <p:sp>
+        <p:nvSpPr>
+          <p:cNvPr id="4" name="Text Placeholder 3">
+            <a:extLst>
+              <a:ext uri="{FF2B5EF4-FFF2-40B4-BE49-F238E27FC236}">
+                <a16:creationId xmlns:a16="http://schemas.microsoft.com/office/drawing/2014/main" xmlns="" id="{A374C5C2-9800-4C61-B8B5-9E14824CE7F0}"/>
+              </a:ext>
+            </a:extLst>
+          </p:cNvPr>
+          <p:cNvSpPr>
+            <a:spLocks noGrp="1"/>
+          </p:cNvSpPr>
+          <p:nvPr>
+            <p:ph type="body" sz="half" idx="2"/>
+          </p:nvPr>
+        </p:nvSpPr>
+        <p:spPr/>
+        <p:txBody>
+          <a:bodyPr/>
+          <a:lstStyle/>
+          <a:p>
             <a:r>
               <a:rPr lang="en-US" dirty="0"/>
-              <a:t>Two sympatric strains of European corn borer with different diapause lengths were reared</a:t>
-            </a:r>
-          </a:p>
-          <a:p>
-            <a:pPr>
-              <a:buFont typeface="Courier New" panose="02070309020205020404" pitchFamily="49" charset="0"/>
-              <a:buChar char="o"/>
-            </a:pPr>
+              <a:t>Dilution information</a:t>
+            </a:r>
+          </a:p>
+          <a:p>
             <a:r>
               <a:rPr lang="en-US" dirty="0"/>
-              <a:t>Digestive efficiency was tested by comparing consumption rate of each strain during fifth instar when feeding on corn plant leaves</a:t>
+              <a:t>FAMEs</a:t>
+            </a:r>
+          </a:p>
+          <a:p>
+            <a:r>
+              <a:rPr lang="en-US" dirty="0"/>
+              <a:t>Insect rearing</a:t>
             </a:r>
           </a:p>
         </p:txBody>
@@ -5121,7 +5623,7 @@
     </p:spTree>
     <p:extLst>
       <p:ext uri="{BB962C8B-B14F-4D97-AF65-F5344CB8AC3E}">
-        <p14:creationId xmlns:p14="http://schemas.microsoft.com/office/powerpoint/2010/main" val="1248982014"/>
+        <p14:creationId xmlns:p14="http://schemas.microsoft.com/office/powerpoint/2010/main" xmlns="" val="1452706979"/>
       </p:ext>
     </p:extLst>
   </p:cSld>
@@ -5153,7 +5655,7 @@
           <p:cNvPr id="2" name="Title 1">
             <a:extLst>
               <a:ext uri="{FF2B5EF4-FFF2-40B4-BE49-F238E27FC236}">
-                <a16:creationId xmlns:a16="http://schemas.microsoft.com/office/drawing/2014/main" id="{CE697039-B4E2-4445-B18E-3CCC270258B8}"/>
+                <a16:creationId xmlns:a16="http://schemas.microsoft.com/office/drawing/2014/main" xmlns="" id="{041F9D61-CC37-4752-8CCC-4C49A0387096}"/>
               </a:ext>
             </a:extLst>
           </p:cNvPr>
@@ -5178,10 +5680,10 @@
       </p:sp>
       <p:sp>
         <p:nvSpPr>
-          <p:cNvPr id="4" name="Text Placeholder 3">
+          <p:cNvPr id="3" name="Content Placeholder 2">
             <a:extLst>
               <a:ext uri="{FF2B5EF4-FFF2-40B4-BE49-F238E27FC236}">
-                <a16:creationId xmlns:a16="http://schemas.microsoft.com/office/drawing/2014/main" id="{7B828874-B7C4-4314-B2B8-1F1536C9DDEA}"/>
+                <a16:creationId xmlns:a16="http://schemas.microsoft.com/office/drawing/2014/main" xmlns="" id="{4BAAFEAC-835A-4EA4-A09A-B25590C38D95}"/>
               </a:ext>
             </a:extLst>
           </p:cNvPr>
@@ -5189,22 +5691,39 @@
             <a:spLocks noGrp="1"/>
           </p:cNvSpPr>
           <p:nvPr>
-            <p:ph type="body" sz="half" idx="2"/>
-          </p:nvPr>
-        </p:nvSpPr>
-        <p:spPr/>
-        <p:txBody>
-          <a:bodyPr/>
-          <a:lstStyle/>
-          <a:p>
-            <a:endParaRPr lang="en-US"/>
+            <p:ph idx="1"/>
+          </p:nvPr>
+        </p:nvSpPr>
+        <p:spPr/>
+        <p:txBody>
+          <a:bodyPr/>
+          <a:lstStyle/>
+          <a:p>
+            <a:pPr>
+              <a:buFont typeface="Courier New" panose="02070309020205020404" pitchFamily="49" charset="0"/>
+              <a:buChar char="o"/>
+            </a:pPr>
+            <a:r>
+              <a:rPr lang="en-US" dirty="0"/>
+              <a:t>Two sympatric strains of European corn borer with different diapause lengths were reared</a:t>
+            </a:r>
+          </a:p>
+          <a:p>
+            <a:pPr>
+              <a:buFont typeface="Courier New" panose="02070309020205020404" pitchFamily="49" charset="0"/>
+              <a:buChar char="o"/>
+            </a:pPr>
+            <a:r>
+              <a:rPr lang="en-US" dirty="0"/>
+              <a:t>Digestive efficiency was tested by comparing consumption rate of each strain during fifth instar when feeding on corn plant leaves</a:t>
+            </a:r>
           </a:p>
         </p:txBody>
       </p:sp>
     </p:spTree>
     <p:extLst>
       <p:ext uri="{BB962C8B-B14F-4D97-AF65-F5344CB8AC3E}">
-        <p14:creationId xmlns:p14="http://schemas.microsoft.com/office/powerpoint/2010/main" val="945707428"/>
+        <p14:creationId xmlns:p14="http://schemas.microsoft.com/office/powerpoint/2010/main" xmlns="" val="1248982014"/>
       </p:ext>
     </p:extLst>
   </p:cSld>
@@ -5236,7 +5755,7 @@
           <p:cNvPr id="2" name="Title 1">
             <a:extLst>
               <a:ext uri="{FF2B5EF4-FFF2-40B4-BE49-F238E27FC236}">
-                <a16:creationId xmlns:a16="http://schemas.microsoft.com/office/drawing/2014/main" id="{70D48B48-8FF1-413E-880E-7681A875DA81}"/>
+                <a16:creationId xmlns:a16="http://schemas.microsoft.com/office/drawing/2014/main" xmlns="" id="{CE697039-B4E2-4445-B18E-3CCC270258B8}"/>
               </a:ext>
             </a:extLst>
           </p:cNvPr>
@@ -5254,17 +5773,17 @@
           <a:p>
             <a:r>
               <a:rPr lang="en-US" dirty="0"/>
-              <a:t>Results</a:t>
-            </a:r>
-          </a:p>
-        </p:txBody>
-      </p:sp>
-      <p:sp>
-        <p:nvSpPr>
-          <p:cNvPr id="3" name="Content Placeholder 2">
+              <a:t>Methodology- Insect Rearing</a:t>
+            </a:r>
+          </a:p>
+        </p:txBody>
+      </p:sp>
+      <p:sp>
+        <p:nvSpPr>
+          <p:cNvPr id="4" name="Text Placeholder 3">
             <a:extLst>
               <a:ext uri="{FF2B5EF4-FFF2-40B4-BE49-F238E27FC236}">
-                <a16:creationId xmlns:a16="http://schemas.microsoft.com/office/drawing/2014/main" id="{40EF1FC0-EB1C-45A1-A377-1A31EDB1307C}"/>
+                <a16:creationId xmlns:a16="http://schemas.microsoft.com/office/drawing/2014/main" xmlns="" id="{7B828874-B7C4-4314-B2B8-1F1536C9DDEA}"/>
               </a:ext>
             </a:extLst>
           </p:cNvPr>
@@ -5272,39 +5791,22 @@
             <a:spLocks noGrp="1"/>
           </p:cNvSpPr>
           <p:nvPr>
-            <p:ph idx="1"/>
-          </p:nvPr>
-        </p:nvSpPr>
-        <p:spPr/>
-        <p:txBody>
-          <a:bodyPr/>
-          <a:lstStyle/>
-          <a:p>
-            <a:pPr>
-              <a:buFont typeface="Courier New" panose="02070309020205020404" pitchFamily="49" charset="0"/>
-              <a:buChar char="o"/>
-            </a:pPr>
-            <a:r>
-              <a:rPr lang="en-US" dirty="0"/>
-              <a:t>Shorter diapausing strain had a higher rate of digestive efficiency compared to the strain with longer diapause</a:t>
-            </a:r>
-          </a:p>
-          <a:p>
-            <a:pPr lvl="1">
-              <a:buFont typeface="Courier New" panose="02070309020205020404" pitchFamily="49" charset="0"/>
-              <a:buChar char="o"/>
-            </a:pPr>
-            <a:r>
-              <a:rPr lang="en-US" dirty="0"/>
-              <a:t>Higher digestive efficiency could be beneficial because of higher resource competition</a:t>
-            </a:r>
+            <p:ph type="body" sz="half" idx="2"/>
+          </p:nvPr>
+        </p:nvSpPr>
+        <p:spPr/>
+        <p:txBody>
+          <a:bodyPr/>
+          <a:lstStyle/>
+          <a:p>
+            <a:endParaRPr lang="en-US"/>
           </a:p>
         </p:txBody>
       </p:sp>
     </p:spTree>
     <p:extLst>
       <p:ext uri="{BB962C8B-B14F-4D97-AF65-F5344CB8AC3E}">
-        <p14:creationId xmlns:p14="http://schemas.microsoft.com/office/powerpoint/2010/main" val="1994198642"/>
+        <p14:creationId xmlns:p14="http://schemas.microsoft.com/office/powerpoint/2010/main" xmlns="" val="945707428"/>
       </p:ext>
     </p:extLst>
   </p:cSld>
@@ -5333,13 +5835,7 @@
       </p:grpSpPr>
       <p:sp>
         <p:nvSpPr>
-          <p:cNvPr id="2" name="Title 1">
-            <a:extLst>
-              <a:ext uri="{FF2B5EF4-FFF2-40B4-BE49-F238E27FC236}">
-                <a16:creationId xmlns:a16="http://schemas.microsoft.com/office/drawing/2014/main" id="{0883E4F5-61BD-4447-888A-091C5F45A555}"/>
-              </a:ext>
-            </a:extLst>
-          </p:cNvPr>
+          <p:cNvPr id="2" name="Title 1"/>
           <p:cNvSpPr>
             <a:spLocks noGrp="1"/>
           </p:cNvSpPr>
@@ -5352,125 +5848,55 @@
           <a:bodyPr/>
           <a:lstStyle/>
           <a:p>
-            <a:r>
-              <a:rPr lang="en-US" dirty="0"/>
-              <a:t>Results</a:t>
-            </a:r>
-          </a:p>
-        </p:txBody>
-      </p:sp>
-      <p:sp>
-        <p:nvSpPr>
-          <p:cNvPr id="3" name="Text Placeholder 2">
-            <a:extLst>
-              <a:ext uri="{FF2B5EF4-FFF2-40B4-BE49-F238E27FC236}">
-                <a16:creationId xmlns:a16="http://schemas.microsoft.com/office/drawing/2014/main" id="{85E7B115-B260-47D6-8DDB-4DD714533DF0}"/>
-              </a:ext>
-            </a:extLst>
-          </p:cNvPr>
-          <p:cNvSpPr>
-            <a:spLocks noGrp="1"/>
-          </p:cNvSpPr>
-          <p:nvPr>
-            <p:ph type="body" idx="1"/>
-          </p:nvPr>
-        </p:nvSpPr>
-        <p:spPr/>
-        <p:txBody>
-          <a:bodyPr/>
-          <a:lstStyle/>
-          <a:p>
-            <a:r>
-              <a:rPr lang="en-US" dirty="0"/>
-              <a:t>Graphs</a:t>
-            </a:r>
-          </a:p>
-        </p:txBody>
-      </p:sp>
-      <p:sp>
-        <p:nvSpPr>
-          <p:cNvPr id="4" name="Content Placeholder 3">
-            <a:extLst>
-              <a:ext uri="{FF2B5EF4-FFF2-40B4-BE49-F238E27FC236}">
-                <a16:creationId xmlns:a16="http://schemas.microsoft.com/office/drawing/2014/main" id="{DFD8B28C-E82A-4C37-B0C5-C09AC206D98F}"/>
-              </a:ext>
-            </a:extLst>
-          </p:cNvPr>
-          <p:cNvSpPr>
-            <a:spLocks noGrp="1"/>
-          </p:cNvSpPr>
-          <p:nvPr>
-            <p:ph sz="half" idx="2"/>
-          </p:nvPr>
-        </p:nvSpPr>
-        <p:spPr/>
-        <p:txBody>
-          <a:bodyPr/>
-          <a:lstStyle/>
-          <a:p>
-            <a:endParaRPr lang="en-US"/>
-          </a:p>
-        </p:txBody>
-      </p:sp>
-      <p:sp>
-        <p:nvSpPr>
-          <p:cNvPr id="5" name="Text Placeholder 4">
-            <a:extLst>
-              <a:ext uri="{FF2B5EF4-FFF2-40B4-BE49-F238E27FC236}">
-                <a16:creationId xmlns:a16="http://schemas.microsoft.com/office/drawing/2014/main" id="{FD0BB881-B19B-4709-8C57-1184BF9F7AC1}"/>
-              </a:ext>
-            </a:extLst>
-          </p:cNvPr>
-          <p:cNvSpPr>
-            <a:spLocks noGrp="1"/>
-          </p:cNvSpPr>
-          <p:nvPr>
-            <p:ph type="body" sz="quarter" idx="3"/>
-          </p:nvPr>
-        </p:nvSpPr>
-        <p:spPr/>
-        <p:txBody>
-          <a:bodyPr/>
-          <a:lstStyle/>
-          <a:p>
-            <a:r>
-              <a:rPr lang="en-US" dirty="0"/>
-              <a:t>graphs</a:t>
-            </a:r>
-          </a:p>
-        </p:txBody>
-      </p:sp>
-      <p:sp>
-        <p:nvSpPr>
-          <p:cNvPr id="6" name="Content Placeholder 5">
-            <a:extLst>
-              <a:ext uri="{FF2B5EF4-FFF2-40B4-BE49-F238E27FC236}">
-                <a16:creationId xmlns:a16="http://schemas.microsoft.com/office/drawing/2014/main" id="{26E5540A-0F8F-4E68-BF68-49B92A0DDFBD}"/>
-              </a:ext>
-            </a:extLst>
-          </p:cNvPr>
-          <p:cNvSpPr>
-            <a:spLocks noGrp="1"/>
-          </p:cNvSpPr>
-          <p:nvPr>
-            <p:ph sz="quarter" idx="4"/>
-          </p:nvPr>
-        </p:nvSpPr>
-        <p:spPr/>
-        <p:txBody>
-          <a:bodyPr/>
-          <a:lstStyle/>
-          <a:p>
-            <a:endParaRPr lang="en-US"/>
+            <a:endParaRPr lang="en-US" dirty="0"/>
+          </a:p>
+        </p:txBody>
+      </p:sp>
+      <p:sp>
+        <p:nvSpPr>
+          <p:cNvPr id="3" name="Content Placeholder 2"/>
+          <p:cNvSpPr>
+            <a:spLocks noGrp="1"/>
+          </p:cNvSpPr>
+          <p:nvPr>
+            <p:ph idx="1"/>
+          </p:nvPr>
+        </p:nvSpPr>
+        <p:spPr/>
+        <p:txBody>
+          <a:bodyPr/>
+          <a:lstStyle/>
+          <a:p>
+            <a:r>
+              <a:rPr lang="en-US" dirty="0" smtClean="0"/>
+              <a:t>Edit: </a:t>
+            </a:r>
+          </a:p>
+          <a:p>
+            <a:pPr lvl="1"/>
+            <a:r>
+              <a:rPr lang="en-US" dirty="0" smtClean="0"/>
+              <a:t>Hypothesis of the </a:t>
+            </a:r>
+            <a:r>
+              <a:rPr lang="en-US" dirty="0" err="1" smtClean="0"/>
+              <a:t>experiemnt</a:t>
+            </a:r>
+            <a:r>
+              <a:rPr lang="en-US" dirty="0" smtClean="0"/>
+              <a:t>. </a:t>
+            </a:r>
+          </a:p>
+          <a:p>
+            <a:pPr lvl="1"/>
+            <a:r>
+              <a:rPr lang="en-US" dirty="0" smtClean="0"/>
+              <a:t>What are we testing and what do we think will happen, hypothetically?</a:t>
+            </a:r>
           </a:p>
         </p:txBody>
       </p:sp>
     </p:spTree>
-    <p:extLst>
-      <p:ext uri="{BB962C8B-B14F-4D97-AF65-F5344CB8AC3E}">
-        <p14:creationId xmlns:p14="http://schemas.microsoft.com/office/powerpoint/2010/main" val="3622802638"/>
-      </p:ext>
-    </p:extLst>
   </p:cSld>
   <p:clrMapOvr>
     <a:masterClrMapping/>
@@ -5521,7 +5947,7 @@
     </a:clrScheme>
     <a:fontScheme name="Retrospect">
       <a:majorFont>
-        <a:latin typeface="Calibri Light" panose="020F0302020204030204"/>
+        <a:latin typeface="Calibri Light"/>
         <a:ea typeface=""/>
         <a:cs typeface=""/>
         <a:font script="Jpan" typeface="ＭＳ Ｐゴシック"/>
@@ -5556,7 +5982,7 @@
         <a:font script="Geor" typeface="Sylfaen"/>
       </a:majorFont>
       <a:minorFont>
-        <a:latin typeface="Calibri" panose="020F0502020204030204"/>
+        <a:latin typeface="Calibri"/>
         <a:ea typeface=""/>
         <a:cs typeface=""/>
         <a:font script="Jpan" typeface="ＭＳ Ｐゴシック"/>
@@ -5755,7 +6181,7 @@
   <a:extraClrSchemeLst/>
   <a:extLst>
     <a:ext uri="{05A4C25C-085E-4340-85A3-A5531E510DB2}">
-      <thm15:themeFamily xmlns:thm15="http://schemas.microsoft.com/office/thememl/2012/main" name="Retrospect" id="{5F128B03-DCCA-4EEB-AB3B-CF2899314A46}" vid="{3F1AAB62-24C6-49D2-8E01-B56FAC9A3DCD}"/>
+      <thm15:themeFamily xmlns:thm15="http://schemas.microsoft.com/office/thememl/2012/main" xmlns="" name="Retrospect" id="{5F128B03-DCCA-4EEB-AB3B-CF2899314A46}" vid="{3F1AAB62-24C6-49D2-8E01-B56FAC9A3DCD}"/>
     </a:ext>
   </a:extLst>
 </a:theme>

</xml_diff>